<commit_message>
Kế hoạch nội dung thuyết trình theo thời gian
</commit_message>
<xml_diff>
--- a/Documents/JobZoom Presentation.pptx
+++ b/Documents/JobZoom Presentation.pptx
@@ -5,10 +5,10 @@
     <p:sldMasterId id="2147483694" r:id="rId1"/>
   </p:sldMasterIdLst>
   <p:notesMasterIdLst>
-    <p:notesMasterId r:id="rId36"/>
+    <p:notesMasterId r:id="rId35"/>
   </p:notesMasterIdLst>
   <p:handoutMasterIdLst>
-    <p:handoutMasterId r:id="rId37"/>
+    <p:handoutMasterId r:id="rId36"/>
   </p:handoutMasterIdLst>
   <p:sldIdLst>
     <p:sldId id="292" r:id="rId2"/>
@@ -23,28 +23,27 @@
     <p:sldId id="286" r:id="rId11"/>
     <p:sldId id="287" r:id="rId12"/>
     <p:sldId id="288" r:id="rId13"/>
-    <p:sldId id="291" r:id="rId14"/>
-    <p:sldId id="263" r:id="rId15"/>
-    <p:sldId id="289" r:id="rId16"/>
-    <p:sldId id="280" r:id="rId17"/>
-    <p:sldId id="285" r:id="rId18"/>
-    <p:sldId id="265" r:id="rId19"/>
-    <p:sldId id="266" r:id="rId20"/>
-    <p:sldId id="282" r:id="rId21"/>
-    <p:sldId id="267" r:id="rId22"/>
-    <p:sldId id="268" r:id="rId23"/>
-    <p:sldId id="269" r:id="rId24"/>
-    <p:sldId id="264" r:id="rId25"/>
-    <p:sldId id="270" r:id="rId26"/>
-    <p:sldId id="271" r:id="rId27"/>
-    <p:sldId id="272" r:id="rId28"/>
-    <p:sldId id="273" r:id="rId29"/>
-    <p:sldId id="274" r:id="rId30"/>
-    <p:sldId id="275" r:id="rId31"/>
-    <p:sldId id="279" r:id="rId32"/>
-    <p:sldId id="276" r:id="rId33"/>
-    <p:sldId id="277" r:id="rId34"/>
-    <p:sldId id="278" r:id="rId35"/>
+    <p:sldId id="263" r:id="rId14"/>
+    <p:sldId id="289" r:id="rId15"/>
+    <p:sldId id="280" r:id="rId16"/>
+    <p:sldId id="285" r:id="rId17"/>
+    <p:sldId id="265" r:id="rId18"/>
+    <p:sldId id="266" r:id="rId19"/>
+    <p:sldId id="282" r:id="rId20"/>
+    <p:sldId id="267" r:id="rId21"/>
+    <p:sldId id="268" r:id="rId22"/>
+    <p:sldId id="269" r:id="rId23"/>
+    <p:sldId id="264" r:id="rId24"/>
+    <p:sldId id="270" r:id="rId25"/>
+    <p:sldId id="271" r:id="rId26"/>
+    <p:sldId id="272" r:id="rId27"/>
+    <p:sldId id="273" r:id="rId28"/>
+    <p:sldId id="274" r:id="rId29"/>
+    <p:sldId id="275" r:id="rId30"/>
+    <p:sldId id="279" r:id="rId31"/>
+    <p:sldId id="276" r:id="rId32"/>
+    <p:sldId id="277" r:id="rId33"/>
+    <p:sldId id="278" r:id="rId34"/>
   </p:sldIdLst>
   <p:sldSz cx="9144000" cy="6858000" type="screen4x3"/>
   <p:notesSz cx="6858000" cy="9144000"/>
@@ -6023,7 +6022,7 @@
             <a:pPr algn="ctr"/>
             <a:fld id="{DB3AC4FF-7527-473D-9116-A78ACDB7B002}" type="datetime8">
               <a:rPr lang="en-US" smtClean="0"/>
-              <a:t>1/6/2012 3:01 AM</a:t>
+              <a:t>1/6/2012 5:52 AM</a:t>
             </a:fld>
             <a:endParaRPr lang="en-US" sz="2000" dirty="0">
               <a:solidFill>
@@ -6239,7 +6238,7 @@
                   <a:schemeClr val="tx2"/>
                 </a:solidFill>
               </a:rPr>
-              <a:t>1/6/2012 3:01 AM</a:t>
+              <a:t>1/6/2012 5:52 AM</a:t>
             </a:fld>
             <a:endParaRPr lang="en-US"/>
           </a:p>
@@ -6435,7 +6434,7 @@
                   <a:schemeClr val="tx2"/>
                 </a:solidFill>
               </a:rPr>
-              <a:t>1/6/2012 3:01 AM</a:t>
+              <a:t>1/6/2012 5:52 AM</a:t>
             </a:fld>
             <a:endParaRPr lang="en-US" dirty="0"/>
           </a:p>
@@ -6737,7 +6736,7 @@
           <a:p>
             <a:fld id="{ACFA9F14-9E1D-4A50-9760-EADEBCF8875A}" type="datetime8">
               <a:rPr lang="en-US" smtClean="0"/>
-              <a:t>1/6/2012 3:01 AM</a:t>
+              <a:t>1/6/2012 5:52 AM</a:t>
             </a:fld>
             <a:endParaRPr lang="en-US" dirty="0"/>
           </a:p>
@@ -7153,7 +7152,7 @@
           <a:p>
             <a:fld id="{67583CB6-BCF9-42D4-BCDC-9094FDF08539}" type="datetime8">
               <a:rPr lang="en-US" smtClean="0"/>
-              <a:t>1/6/2012 3:01 AM</a:t>
+              <a:t>1/6/2012 5:52 AM</a:t>
             </a:fld>
             <a:endParaRPr lang="en-US"/>
           </a:p>
@@ -7408,7 +7407,7 @@
           <a:p>
             <a:fld id="{F3B0C4B6-2525-4AE6-B3C3-55AC237D96E5}" type="datetime8">
               <a:rPr lang="en-US" smtClean="0"/>
-              <a:t>1/6/2012 3:01 AM</a:t>
+              <a:t>1/6/2012 5:52 AM</a:t>
             </a:fld>
             <a:endParaRPr lang="en-US"/>
           </a:p>
@@ -7653,7 +7652,7 @@
           <a:p>
             <a:fld id="{B0884233-0FCF-49FD-96DF-1DAAE5FB8E5F}" type="datetime8">
               <a:rPr lang="en-US" smtClean="0"/>
-              <a:t>1/6/2012 3:01 AM</a:t>
+              <a:t>1/6/2012 5:52 AM</a:t>
             </a:fld>
             <a:endParaRPr lang="en-US"/>
           </a:p>
@@ -7850,7 +7849,7 @@
           <a:p>
             <a:fld id="{925A36DC-A6B9-49A0-8592-C10893892C73}" type="datetime8">
               <a:rPr lang="en-US" smtClean="0"/>
-              <a:t>1/6/2012 3:01 AM</a:t>
+              <a:t>1/6/2012 5:52 AM</a:t>
             </a:fld>
             <a:endParaRPr lang="en-US"/>
           </a:p>
@@ -7953,7 +7952,7 @@
           <a:p>
             <a:fld id="{9D46CA07-655C-445C-9C09-8E6C2DF4CEC3}" type="datetime8">
               <a:rPr lang="en-US" smtClean="0"/>
-              <a:t>1/6/2012 3:01 AM</a:t>
+              <a:t>1/6/2012 5:52 AM</a:t>
             </a:fld>
             <a:endParaRPr lang="en-US"/>
           </a:p>
@@ -8101,7 +8100,7 @@
           <a:p>
             <a:fld id="{F2D3B79E-6498-490A-A85A-E8302493EBB7}" type="datetime8">
               <a:rPr lang="en-US" smtClean="0"/>
-              <a:t>1/6/2012 3:01 AM</a:t>
+              <a:t>1/6/2012 5:52 AM</a:t>
             </a:fld>
             <a:endParaRPr lang="en-US"/>
           </a:p>
@@ -8575,7 +8574,7 @@
           <a:p>
             <a:fld id="{D73C48E5-5E3A-4FFD-8978-6ECFCE87ADA1}" type="datetime8">
               <a:rPr lang="en-US" smtClean="0"/>
-              <a:t>1/6/2012 3:01 AM</a:t>
+              <a:t>1/6/2012 5:52 AM</a:t>
             </a:fld>
             <a:endParaRPr lang="en-US"/>
           </a:p>
@@ -8858,7 +8857,7 @@
                   <a:schemeClr val="tx2"/>
                 </a:solidFill>
               </a:rPr>
-              <a:t>1/6/2012 3:01 AM</a:t>
+              <a:t>1/6/2012 5:52 AM</a:t>
             </a:fld>
             <a:endParaRPr lang="en-US" sz="1400" dirty="0">
               <a:solidFill>
@@ -9505,7 +9504,7 @@
         <p:spPr>
           <a:xfrm>
             <a:off x="0" y="0"/>
-            <a:ext cx="9144000" cy="6096000"/>
+            <a:ext cx="9144000" cy="6858000"/>
           </a:xfrm>
         </p:spPr>
         <p:txBody>
@@ -9515,75 +9514,283 @@
           <a:lstStyle/>
           <a:p>
             <a:r>
+              <a:rPr lang="en-US" smtClean="0">
+                <a:solidFill>
+                  <a:srgbClr val="FF0000"/>
+                </a:solidFill>
+              </a:rPr>
+              <a:t>Thuyết trình: </a:t>
+            </a:r>
+            <a:r>
+              <a:rPr lang="en-US" smtClean="0">
+                <a:solidFill>
+                  <a:srgbClr val="FF0000"/>
+                </a:solidFill>
+              </a:rPr>
+              <a:t>25 </a:t>
+            </a:r>
+            <a:r>
+              <a:rPr lang="en-US" smtClean="0">
+                <a:solidFill>
+                  <a:srgbClr val="FF0000"/>
+                </a:solidFill>
+              </a:rPr>
+              <a:t>mins</a:t>
+            </a:r>
+          </a:p>
+          <a:p>
+            <a:pPr lvl="1"/>
+            <a:r>
+              <a:rPr lang="en-US" u="sng" smtClean="0"/>
+              <a:t>Giới thiệu bài toán:</a:t>
+            </a:r>
+            <a:r>
               <a:rPr lang="en-US" smtClean="0"/>
-              <a:t>Thuyết trình: 15 mins</a:t>
-            </a:r>
+              <a:t> 				</a:t>
+            </a:r>
+            <a:r>
+              <a:rPr lang="en-US" smtClean="0"/>
+              <a:t>	</a:t>
+            </a:r>
+            <a:r>
+              <a:rPr lang="en-US" b="1" smtClean="0">
+                <a:solidFill>
+                  <a:srgbClr val="FF0000"/>
+                </a:solidFill>
+              </a:rPr>
+              <a:t>3’</a:t>
+            </a:r>
+            <a:endParaRPr lang="en-US" b="1" smtClean="0">
+              <a:solidFill>
+                <a:srgbClr val="FF0000"/>
+              </a:solidFill>
+            </a:endParaRPr>
           </a:p>
           <a:p>
             <a:pPr lvl="1"/>
             <a:r>
+              <a:rPr lang="en-US" u="sng" smtClean="0"/>
+              <a:t>Giải quyết bài toán</a:t>
+            </a:r>
+            <a:r>
+              <a:rPr lang="en-US" u="sng" smtClean="0"/>
+              <a:t>:</a:t>
+            </a:r>
+            <a:r>
               <a:rPr lang="en-US" smtClean="0"/>
-              <a:t>Giới thiệu bài toán: 				3 mins</a:t>
-            </a:r>
+              <a:t>					</a:t>
+            </a:r>
+            <a:r>
+              <a:rPr lang="en-US" b="1" smtClean="0">
+                <a:solidFill>
+                  <a:srgbClr val="FF0000"/>
+                </a:solidFill>
+              </a:rPr>
+              <a:t>6’</a:t>
+            </a:r>
+            <a:endParaRPr lang="en-US" b="1" smtClean="0">
+              <a:solidFill>
+                <a:srgbClr val="FF0000"/>
+              </a:solidFill>
+            </a:endParaRPr>
+          </a:p>
+          <a:p>
+            <a:pPr lvl="2"/>
+            <a:r>
+              <a:rPr lang="en-US" smtClean="0"/>
+              <a:t>Tổ chức thông tin theo Hierarchy: 		</a:t>
+            </a:r>
+            <a:r>
+              <a:rPr lang="en-US" smtClean="0"/>
+              <a:t>	</a:t>
+            </a:r>
+            <a:r>
+              <a:rPr lang="en-US" i="1" smtClean="0"/>
+              <a:t>2’</a:t>
+            </a:r>
+            <a:endParaRPr lang="en-US" i="1" smtClean="0"/>
+          </a:p>
+          <a:p>
+            <a:pPr lvl="2"/>
+            <a:r>
+              <a:rPr lang="en-US" smtClean="0"/>
+              <a:t>So khớp thông tin: 				</a:t>
+            </a:r>
+            <a:r>
+              <a:rPr lang="en-US" smtClean="0"/>
+              <a:t>	</a:t>
+            </a:r>
+            <a:r>
+              <a:rPr lang="en-US" i="1" smtClean="0"/>
+              <a:t>2’</a:t>
+            </a:r>
+            <a:endParaRPr lang="en-US" i="1" smtClean="0"/>
+          </a:p>
+          <a:p>
+            <a:pPr lvl="2"/>
+            <a:r>
+              <a:rPr lang="en-US" smtClean="0"/>
+              <a:t>Ứng dụng Decision tree			</a:t>
+            </a:r>
+            <a:r>
+              <a:rPr lang="en-US" smtClean="0"/>
+              <a:t>	</a:t>
+            </a:r>
+            <a:r>
+              <a:rPr lang="en-US" i="1" smtClean="0"/>
+              <a:t>2’</a:t>
+            </a:r>
+            <a:endParaRPr lang="en-US" i="1" smtClean="0"/>
           </a:p>
           <a:p>
             <a:pPr lvl="1"/>
             <a:r>
+              <a:rPr lang="en-US" u="sng" smtClean="0"/>
+              <a:t>Giải pháp Job Zoom framework:</a:t>
+            </a:r>
+            <a:r>
               <a:rPr lang="en-US" smtClean="0"/>
-              <a:t>Giải quyết bài toán:</a:t>
-            </a:r>
+              <a:t> </a:t>
+            </a:r>
+            <a:r>
+              <a:rPr lang="en-US" smtClean="0"/>
+              <a:t>			</a:t>
+            </a:r>
+            <a:r>
+              <a:rPr lang="en-US" b="1" smtClean="0">
+                <a:solidFill>
+                  <a:srgbClr val="FF0000"/>
+                </a:solidFill>
+              </a:rPr>
+              <a:t>6’</a:t>
+            </a:r>
+            <a:endParaRPr lang="en-US" b="1" smtClean="0">
+              <a:solidFill>
+                <a:srgbClr val="FF0000"/>
+              </a:solidFill>
+            </a:endParaRPr>
           </a:p>
           <a:p>
             <a:pPr lvl="2"/>
             <a:r>
               <a:rPr lang="en-US" smtClean="0"/>
-              <a:t>Tổ chức thông tin theo Hierarchy: 		2 mins</a:t>
+              <a:t>3 + 1 Vấn đề chính cần giải quyết JobZoom	</a:t>
+            </a:r>
+            <a:r>
+              <a:rPr lang="en-US" i="1" smtClean="0"/>
+              <a:t>1’</a:t>
             </a:r>
           </a:p>
           <a:p>
             <a:pPr lvl="2"/>
             <a:r>
               <a:rPr lang="en-US" smtClean="0"/>
-              <a:t>So khớp thông tin: 				2 mins</a:t>
+              <a:t>Kiến trúc tổng quan					</a:t>
+            </a:r>
+            <a:r>
+              <a:rPr lang="en-US" i="1" smtClean="0"/>
+              <a:t>1’</a:t>
             </a:r>
           </a:p>
           <a:p>
             <a:pPr lvl="2"/>
             <a:r>
               <a:rPr lang="en-US" smtClean="0"/>
-              <a:t>Ứng dụng Decision tree			2 mins</a:t>
+              <a:t>Tổ chức Tag &amp; Hierarchy &amp; mapping		</a:t>
+            </a:r>
+            <a:r>
+              <a:rPr lang="en-US" i="1" smtClean="0"/>
+              <a:t>1’</a:t>
+            </a:r>
+            <a:endParaRPr lang="en-US" smtClean="0"/>
+          </a:p>
+          <a:p>
+            <a:pPr lvl="2"/>
+            <a:r>
+              <a:rPr lang="en-US" smtClean="0"/>
+              <a:t>Matching tool						</a:t>
+            </a:r>
+            <a:r>
+              <a:rPr lang="en-US" i="1" smtClean="0"/>
+              <a:t>1’</a:t>
+            </a:r>
+            <a:endParaRPr lang="en-US" smtClean="0"/>
+          </a:p>
+          <a:p>
+            <a:pPr lvl="2"/>
+            <a:r>
+              <a:rPr lang="en-US" smtClean="0"/>
+              <a:t>Decision tree						2’</a:t>
             </a:r>
           </a:p>
           <a:p>
             <a:pPr lvl="1"/>
             <a:r>
+              <a:rPr lang="en-US" u="sng" smtClean="0"/>
+              <a:t>Demo</a:t>
+            </a:r>
+            <a:r>
               <a:rPr lang="en-US" smtClean="0"/>
-              <a:t>Giải pháp Job Zoom framework: 5 phút</a:t>
-            </a:r>
-          </a:p>
-          <a:p>
-            <a:pPr lvl="2"/>
+              <a:t>							</a:t>
+            </a:r>
+            <a:r>
+              <a:rPr lang="en-US" b="1" smtClean="0">
+                <a:solidFill>
+                  <a:srgbClr val="FF0000"/>
+                </a:solidFill>
+              </a:rPr>
+              <a:t>8’</a:t>
+            </a:r>
+          </a:p>
+          <a:p>
+            <a:pPr lvl="1"/>
+            <a:r>
+              <a:rPr lang="en-US" u="sng" smtClean="0"/>
+              <a:t>Đánh giá &amp; hướng phát triển</a:t>
+            </a:r>
             <a:r>
               <a:rPr lang="en-US" smtClean="0"/>
-              <a:t>Các vấn đề cần giải quyết:			1 min</a:t>
-            </a:r>
-          </a:p>
-          <a:p>
-            <a:pPr lvl="2"/>
-            <a:endParaRPr lang="en-US" smtClean="0"/>
-          </a:p>
-          <a:p>
-            <a:r>
-              <a:rPr lang="en-US" smtClean="0"/>
-              <a:t>Demo: 10 phút</a:t>
-            </a:r>
-          </a:p>
-          <a:p>
-            <a:r>
-              <a:rPr lang="en-US" smtClean="0"/>
-              <a:t>Q&amp;A: 20 phút</a:t>
-            </a:r>
-            <a:endParaRPr lang="en-US"/>
+              <a:t>			</a:t>
+            </a:r>
+            <a:r>
+              <a:rPr lang="en-US" b="1" smtClean="0">
+                <a:solidFill>
+                  <a:srgbClr val="FF0000"/>
+                </a:solidFill>
+              </a:rPr>
+              <a:t>2’</a:t>
+            </a:r>
+          </a:p>
+          <a:p>
+            <a:r>
+              <a:rPr lang="en-US" smtClean="0">
+                <a:solidFill>
+                  <a:srgbClr val="FF0000"/>
+                </a:solidFill>
+              </a:rPr>
+              <a:t>Q&amp;A</a:t>
+            </a:r>
+            <a:r>
+              <a:rPr lang="en-US" smtClean="0">
+                <a:solidFill>
+                  <a:srgbClr val="FF0000"/>
+                </a:solidFill>
+              </a:rPr>
+              <a:t>: 20 </a:t>
+            </a:r>
+            <a:r>
+              <a:rPr lang="en-US" smtClean="0">
+                <a:solidFill>
+                  <a:srgbClr val="FF0000"/>
+                </a:solidFill>
+              </a:rPr>
+              <a:t>mins</a:t>
+            </a:r>
+            <a:endParaRPr lang="en-US">
+              <a:solidFill>
+                <a:srgbClr val="FF0000"/>
+              </a:solidFill>
+            </a:endParaRPr>
           </a:p>
         </p:txBody>
       </p:sp>
@@ -9597,11 +9804,11 @@
   <p:clrMapOvr>
     <a:masterClrMapping/>
   </p:clrMapOvr>
-  <mc:AlternateContent xmlns:mc="http://schemas.openxmlformats.org/markup-compatibility/2006">
-    <mc:Choice xmlns:p14="http://schemas.microsoft.com/office/powerpoint/2010/main" Requires="p14">
+  <mc:AlternateContent xmlns:mc="http://schemas.openxmlformats.org/markup-compatibility/2006" xmlns:p14="http://schemas.microsoft.com/office/powerpoint/2010/main">
+    <mc:Choice Requires="p14">
       <p:transition spd="slow" p14:dur="2000"/>
     </mc:Choice>
-    <mc:Fallback>
+    <mc:Fallback xmlns="">
       <p:transition spd="slow"/>
     </mc:Fallback>
   </mc:AlternateContent>
@@ -9740,11 +9947,11 @@
   <p:clrMapOvr>
     <a:masterClrMapping/>
   </p:clrMapOvr>
-  <mc:AlternateContent xmlns:mc="http://schemas.openxmlformats.org/markup-compatibility/2006">
-    <mc:Choice xmlns:p14="http://schemas.microsoft.com/office/powerpoint/2010/main" Requires="p14">
+  <mc:AlternateContent xmlns:mc="http://schemas.openxmlformats.org/markup-compatibility/2006" xmlns:p14="http://schemas.microsoft.com/office/powerpoint/2010/main">
+    <mc:Choice Requires="p14">
       <p:transition spd="slow" p14:dur="2000"/>
     </mc:Choice>
-    <mc:Fallback>
+    <mc:Fallback xmlns="">
       <p:transition spd="slow"/>
     </mc:Fallback>
   </mc:AlternateContent>
@@ -9883,11 +10090,11 @@
   <p:clrMapOvr>
     <a:masterClrMapping/>
   </p:clrMapOvr>
-  <mc:AlternateContent xmlns:mc="http://schemas.openxmlformats.org/markup-compatibility/2006">
-    <mc:Choice xmlns:p14="http://schemas.microsoft.com/office/powerpoint/2010/main" Requires="p14">
+  <mc:AlternateContent xmlns:mc="http://schemas.openxmlformats.org/markup-compatibility/2006" xmlns:p14="http://schemas.microsoft.com/office/powerpoint/2010/main">
+    <mc:Choice Requires="p14">
       <p:transition spd="slow" p14:dur="2000"/>
     </mc:Choice>
-    <mc:Fallback>
+    <mc:Fallback xmlns="">
       <p:transition spd="slow"/>
     </mc:Fallback>
   </mc:AlternateContent>
@@ -10123,11 +10330,11 @@
   <p:clrMapOvr>
     <a:masterClrMapping/>
   </p:clrMapOvr>
-  <mc:AlternateContent xmlns:mc="http://schemas.openxmlformats.org/markup-compatibility/2006">
-    <mc:Choice xmlns:p14="http://schemas.microsoft.com/office/powerpoint/2010/main" Requires="p14">
+  <mc:AlternateContent xmlns:mc="http://schemas.openxmlformats.org/markup-compatibility/2006" xmlns:p14="http://schemas.microsoft.com/office/powerpoint/2010/main">
+    <mc:Choice Requires="p14">
       <p:transition spd="slow" p14:dur="2000"/>
     </mc:Choice>
-    <mc:Fallback>
+    <mc:Fallback xmlns="">
       <p:transition spd="slow"/>
     </mc:Fallback>
   </mc:AlternateContent>
@@ -10160,113 +10367,6 @@
       </p:grpSpPr>
       <p:sp>
         <p:nvSpPr>
-          <p:cNvPr id="4" name="Text Placeholder 3"/>
-          <p:cNvSpPr>
-            <a:spLocks noGrp="1"/>
-          </p:cNvSpPr>
-          <p:nvPr>
-            <p:ph type="body" idx="1"/>
-          </p:nvPr>
-        </p:nvSpPr>
-        <p:spPr/>
-        <p:txBody>
-          <a:bodyPr/>
-          <a:lstStyle/>
-          <a:p>
-            <a:endParaRPr lang="en-US"/>
-          </a:p>
-        </p:txBody>
-      </p:sp>
-      <p:sp>
-        <p:nvSpPr>
-          <p:cNvPr id="3" name="Title 2"/>
-          <p:cNvSpPr>
-            <a:spLocks noGrp="1"/>
-          </p:cNvSpPr>
-          <p:nvPr>
-            <p:ph type="title"/>
-          </p:nvPr>
-        </p:nvSpPr>
-        <p:spPr/>
-        <p:txBody>
-          <a:bodyPr/>
-          <a:lstStyle/>
-          <a:p>
-            <a:r>
-              <a:rPr lang="en-US" smtClean="0"/>
-              <a:t>Cơ sở lý thuyết</a:t>
-            </a:r>
-            <a:endParaRPr lang="en-US"/>
-          </a:p>
-        </p:txBody>
-      </p:sp>
-      <p:sp>
-        <p:nvSpPr>
-          <p:cNvPr id="2" name="Slide Number Placeholder 1"/>
-          <p:cNvSpPr>
-            <a:spLocks noGrp="1"/>
-          </p:cNvSpPr>
-          <p:nvPr>
-            <p:ph type="sldNum" sz="quarter" idx="11"/>
-          </p:nvPr>
-        </p:nvSpPr>
-        <p:spPr/>
-        <p:txBody>
-          <a:bodyPr/>
-          <a:lstStyle/>
-          <a:p>
-            <a:fld id="{1AD93096-5B34-4342-9326-69289CEAE4C2}" type="slidenum">
-              <a:rPr lang="en-US" smtClean="0"/>
-              <a:pPr/>
-              <a:t>13</a:t>
-            </a:fld>
-            <a:endParaRPr lang="en-US" dirty="0">
-              <a:solidFill>
-                <a:schemeClr val="tx2"/>
-              </a:solidFill>
-            </a:endParaRPr>
-          </a:p>
-        </p:txBody>
-      </p:sp>
-    </p:spTree>
-    <p:extLst>
-      <p:ext uri="{BB962C8B-B14F-4D97-AF65-F5344CB8AC3E}">
-        <p14:creationId xmlns:p14="http://schemas.microsoft.com/office/powerpoint/2010/main" val="649138217"/>
-      </p:ext>
-    </p:extLst>
-  </p:cSld>
-  <p:clrMapOvr>
-    <a:masterClrMapping/>
-  </p:clrMapOvr>
-  <p:timing>
-    <p:tnLst>
-      <p:par>
-        <p:cTn id="1" dur="indefinite" restart="never" nodeType="tmRoot"/>
-      </p:par>
-    </p:tnLst>
-  </p:timing>
-</p:sld>
-</file>
-
-<file path=ppt/slides/slide14.xml><?xml version="1.0" encoding="utf-8"?>
-<p:sld xmlns:a="http://schemas.openxmlformats.org/drawingml/2006/main" xmlns:r="http://schemas.openxmlformats.org/officeDocument/2006/relationships" xmlns:p="http://schemas.openxmlformats.org/presentationml/2006/main">
-  <p:cSld>
-    <p:spTree>
-      <p:nvGrpSpPr>
-        <p:cNvPr id="1" name=""/>
-        <p:cNvGrpSpPr/>
-        <p:nvPr/>
-      </p:nvGrpSpPr>
-      <p:grpSpPr>
-        <a:xfrm>
-          <a:off x="0" y="0"/>
-          <a:ext cx="0" cy="0"/>
-          <a:chOff x="0" y="0"/>
-          <a:chExt cx="0" cy="0"/>
-        </a:xfrm>
-      </p:grpSpPr>
-      <p:sp>
-        <p:nvSpPr>
           <p:cNvPr id="5" name="Text Placeholder 4"/>
           <p:cNvSpPr>
             <a:spLocks noGrp="1"/>
@@ -10307,11 +10407,7 @@
             </a:r>
             <a:r>
               <a:rPr lang="en-US" smtClean="0"/>
-              <a:t>BÀI </a:t>
-            </a:r>
-            <a:r>
-              <a:rPr lang="en-US" smtClean="0"/>
-              <a:t>TOÁN</a:t>
+              <a:t>BÀI TOÁN</a:t>
             </a:r>
             <a:endParaRPr lang="vi-VN" dirty="0"/>
           </a:p>
@@ -10337,7 +10433,7 @@
             <a:fld id="{1AD93096-5B34-4342-9326-69289CEAE4C2}" type="slidenum">
               <a:rPr lang="en-US" smtClean="0"/>
               <a:pPr/>
-              <a:t>14</a:t>
+              <a:t>13</a:t>
             </a:fld>
             <a:endParaRPr lang="en-US" dirty="0">
               <a:solidFill>
@@ -10487,7 +10583,7 @@
 </p:sld>
 </file>
 
-<file path=ppt/slides/slide15.xml><?xml version="1.0" encoding="utf-8"?>
+<file path=ppt/slides/slide14.xml><?xml version="1.0" encoding="utf-8"?>
 <p:sld xmlns:a="http://schemas.openxmlformats.org/drawingml/2006/main" xmlns:r="http://schemas.openxmlformats.org/officeDocument/2006/relationships" xmlns:p="http://schemas.openxmlformats.org/presentationml/2006/main">
   <p:cSld>
     <p:spTree>
@@ -10525,7 +10621,7 @@
             <a:fld id="{1AD93096-5B34-4342-9326-69289CEAE4C2}" type="slidenum">
               <a:rPr lang="en-US" smtClean="0"/>
               <a:pPr algn="ctr"/>
-              <a:t>15</a:t>
+              <a:t>14</a:t>
             </a:fld>
             <a:endParaRPr lang="en-US" sz="2400" dirty="0">
               <a:solidFill>
@@ -10585,6 +10681,99 @@
 </p:sld>
 </file>
 
+<file path=ppt/slides/slide15.xml><?xml version="1.0" encoding="utf-8"?>
+<p:sld xmlns:a="http://schemas.openxmlformats.org/drawingml/2006/main" xmlns:r="http://schemas.openxmlformats.org/officeDocument/2006/relationships" xmlns:p="http://schemas.openxmlformats.org/presentationml/2006/main">
+  <p:cSld>
+    <p:spTree>
+      <p:nvGrpSpPr>
+        <p:cNvPr id="1" name=""/>
+        <p:cNvGrpSpPr/>
+        <p:nvPr/>
+      </p:nvGrpSpPr>
+      <p:grpSpPr>
+        <a:xfrm>
+          <a:off x="0" y="0"/>
+          <a:ext cx="0" cy="0"/>
+          <a:chOff x="0" y="0"/>
+          <a:chExt cx="0" cy="0"/>
+        </a:xfrm>
+      </p:grpSpPr>
+      <p:sp>
+        <p:nvSpPr>
+          <p:cNvPr id="5" name="Title 4"/>
+          <p:cNvSpPr>
+            <a:spLocks noGrp="1"/>
+          </p:cNvSpPr>
+          <p:nvPr>
+            <p:ph type="title"/>
+          </p:nvPr>
+        </p:nvSpPr>
+        <p:spPr/>
+        <p:txBody>
+          <a:bodyPr>
+            <a:normAutofit/>
+          </a:bodyPr>
+          <a:lstStyle/>
+          <a:p>
+            <a:r>
+              <a:rPr lang="en-US" sz="4000" smtClean="0"/>
+              <a:t>Tag</a:t>
+            </a:r>
+            <a:endParaRPr lang="vi-VN" sz="4000" dirty="0"/>
+          </a:p>
+        </p:txBody>
+      </p:sp>
+      <p:sp>
+        <p:nvSpPr>
+          <p:cNvPr id="4" name="Slide Number Placeholder 3"/>
+          <p:cNvSpPr>
+            <a:spLocks noGrp="1"/>
+          </p:cNvSpPr>
+          <p:nvPr>
+            <p:ph type="sldNum" sz="quarter" idx="12"/>
+          </p:nvPr>
+        </p:nvSpPr>
+        <p:spPr/>
+        <p:txBody>
+          <a:bodyPr>
+            <a:normAutofit fontScale="85000" lnSpcReduction="20000"/>
+          </a:bodyPr>
+          <a:lstStyle/>
+          <a:p>
+            <a:pPr algn="ctr"/>
+            <a:fld id="{1AD93096-5B34-4342-9326-69289CEAE4C2}" type="slidenum">
+              <a:rPr lang="en-US" smtClean="0"/>
+              <a:pPr algn="ctr"/>
+              <a:t>15</a:t>
+            </a:fld>
+            <a:endParaRPr lang="en-US" sz="2400" dirty="0">
+              <a:solidFill>
+                <a:srgbClr val="FFFFFF"/>
+              </a:solidFill>
+            </a:endParaRPr>
+          </a:p>
+        </p:txBody>
+      </p:sp>
+    </p:spTree>
+    <p:extLst>
+      <p:ext uri="{BB962C8B-B14F-4D97-AF65-F5344CB8AC3E}">
+        <p14:creationId xmlns:p14="http://schemas.microsoft.com/office/powerpoint/2010/main" val="3162985393"/>
+      </p:ext>
+    </p:extLst>
+  </p:cSld>
+  <p:clrMapOvr>
+    <a:masterClrMapping/>
+  </p:clrMapOvr>
+  <p:timing>
+    <p:tnLst>
+      <p:par>
+        <p:cTn id="1" dur="indefinite" restart="never" nodeType="tmRoot"/>
+      </p:par>
+    </p:tnLst>
+  </p:timing>
+</p:sld>
+</file>
+
 <file path=ppt/slides/slide16.xml><?xml version="1.0" encoding="utf-8"?>
 <p:sld xmlns:a="http://schemas.openxmlformats.org/drawingml/2006/main" xmlns:r="http://schemas.openxmlformats.org/officeDocument/2006/relationships" xmlns:p="http://schemas.openxmlformats.org/presentationml/2006/main">
   <p:cSld>
@@ -10621,7 +10810,7 @@
           <a:p>
             <a:r>
               <a:rPr lang="en-US" sz="4000" smtClean="0"/>
-              <a:t>Tag</a:t>
+              <a:t>taxonomy</a:t>
             </a:r>
             <a:endParaRPr lang="vi-VN" sz="4000" dirty="0"/>
           </a:p>
@@ -10649,99 +10838,6 @@
               <a:rPr lang="en-US" smtClean="0"/>
               <a:pPr algn="ctr"/>
               <a:t>16</a:t>
-            </a:fld>
-            <a:endParaRPr lang="en-US" sz="2400" dirty="0">
-              <a:solidFill>
-                <a:srgbClr val="FFFFFF"/>
-              </a:solidFill>
-            </a:endParaRPr>
-          </a:p>
-        </p:txBody>
-      </p:sp>
-    </p:spTree>
-    <p:extLst>
-      <p:ext uri="{BB962C8B-B14F-4D97-AF65-F5344CB8AC3E}">
-        <p14:creationId xmlns:p14="http://schemas.microsoft.com/office/powerpoint/2010/main" val="3162985393"/>
-      </p:ext>
-    </p:extLst>
-  </p:cSld>
-  <p:clrMapOvr>
-    <a:masterClrMapping/>
-  </p:clrMapOvr>
-  <p:timing>
-    <p:tnLst>
-      <p:par>
-        <p:cTn id="1" dur="indefinite" restart="never" nodeType="tmRoot"/>
-      </p:par>
-    </p:tnLst>
-  </p:timing>
-</p:sld>
-</file>
-
-<file path=ppt/slides/slide17.xml><?xml version="1.0" encoding="utf-8"?>
-<p:sld xmlns:a="http://schemas.openxmlformats.org/drawingml/2006/main" xmlns:r="http://schemas.openxmlformats.org/officeDocument/2006/relationships" xmlns:p="http://schemas.openxmlformats.org/presentationml/2006/main">
-  <p:cSld>
-    <p:spTree>
-      <p:nvGrpSpPr>
-        <p:cNvPr id="1" name=""/>
-        <p:cNvGrpSpPr/>
-        <p:nvPr/>
-      </p:nvGrpSpPr>
-      <p:grpSpPr>
-        <a:xfrm>
-          <a:off x="0" y="0"/>
-          <a:ext cx="0" cy="0"/>
-          <a:chOff x="0" y="0"/>
-          <a:chExt cx="0" cy="0"/>
-        </a:xfrm>
-      </p:grpSpPr>
-      <p:sp>
-        <p:nvSpPr>
-          <p:cNvPr id="5" name="Title 4"/>
-          <p:cNvSpPr>
-            <a:spLocks noGrp="1"/>
-          </p:cNvSpPr>
-          <p:nvPr>
-            <p:ph type="title"/>
-          </p:nvPr>
-        </p:nvSpPr>
-        <p:spPr/>
-        <p:txBody>
-          <a:bodyPr>
-            <a:normAutofit/>
-          </a:bodyPr>
-          <a:lstStyle/>
-          <a:p>
-            <a:r>
-              <a:rPr lang="en-US" sz="4000" smtClean="0"/>
-              <a:t>taxonomy</a:t>
-            </a:r>
-            <a:endParaRPr lang="vi-VN" sz="4000" dirty="0"/>
-          </a:p>
-        </p:txBody>
-      </p:sp>
-      <p:sp>
-        <p:nvSpPr>
-          <p:cNvPr id="4" name="Slide Number Placeholder 3"/>
-          <p:cNvSpPr>
-            <a:spLocks noGrp="1"/>
-          </p:cNvSpPr>
-          <p:nvPr>
-            <p:ph type="sldNum" sz="quarter" idx="12"/>
-          </p:nvPr>
-        </p:nvSpPr>
-        <p:spPr/>
-        <p:txBody>
-          <a:bodyPr>
-            <a:normAutofit fontScale="85000" lnSpcReduction="20000"/>
-          </a:bodyPr>
-          <a:lstStyle/>
-          <a:p>
-            <a:pPr algn="ctr"/>
-            <a:fld id="{1AD93096-5B34-4342-9326-69289CEAE4C2}" type="slidenum">
-              <a:rPr lang="en-US" smtClean="0"/>
-              <a:pPr algn="ctr"/>
-              <a:t>17</a:t>
             </a:fld>
             <a:endParaRPr lang="en-US" sz="2400" dirty="0">
               <a:solidFill>
@@ -10914,7 +11010,7 @@
 </p:sld>
 </file>
 
-<file path=ppt/slides/slide18.xml><?xml version="1.0" encoding="utf-8"?>
+<file path=ppt/slides/slide17.xml><?xml version="1.0" encoding="utf-8"?>
 <p:sld xmlns:a="http://schemas.openxmlformats.org/drawingml/2006/main" xmlns:r="http://schemas.openxmlformats.org/officeDocument/2006/relationships" xmlns:p="http://schemas.openxmlformats.org/presentationml/2006/main">
   <p:cSld>
     <p:spTree>
@@ -11004,7 +11100,7 @@
             <a:fld id="{1AD93096-5B34-4342-9326-69289CEAE4C2}" type="slidenum">
               <a:rPr lang="en-US" smtClean="0"/>
               <a:pPr/>
-              <a:t>18</a:t>
+              <a:t>17</a:t>
             </a:fld>
             <a:endParaRPr lang="en-US" dirty="0">
               <a:solidFill>
@@ -11179,7 +11275,7 @@
 </p:sld>
 </file>
 
-<file path=ppt/slides/slide19.xml><?xml version="1.0" encoding="utf-8"?>
+<file path=ppt/slides/slide18.xml><?xml version="1.0" encoding="utf-8"?>
 <p:sld xmlns:a="http://schemas.openxmlformats.org/drawingml/2006/main" xmlns:r="http://schemas.openxmlformats.org/officeDocument/2006/relationships" xmlns:p="http://schemas.openxmlformats.org/presentationml/2006/main">
   <p:cSld>
     <p:spTree>
@@ -11257,7 +11353,7 @@
             <a:fld id="{1AD93096-5B34-4342-9326-69289CEAE4C2}" type="slidenum">
               <a:rPr lang="en-US" smtClean="0"/>
               <a:pPr/>
-              <a:t>19</a:t>
+              <a:t>18</a:t>
             </a:fld>
             <a:endParaRPr lang="en-US" dirty="0">
               <a:solidFill>
@@ -11351,769 +11447,7 @@
 </p:sld>
 </file>
 
-<file path=ppt/slides/slide2.xml><?xml version="1.0" encoding="utf-8"?>
-<p:sld xmlns:a="http://schemas.openxmlformats.org/drawingml/2006/main" xmlns:r="http://schemas.openxmlformats.org/officeDocument/2006/relationships" xmlns:p="http://schemas.openxmlformats.org/presentationml/2006/main">
-  <p:cSld>
-    <p:spTree>
-      <p:nvGrpSpPr>
-        <p:cNvPr id="1" name=""/>
-        <p:cNvGrpSpPr/>
-        <p:nvPr/>
-      </p:nvGrpSpPr>
-      <p:grpSpPr>
-        <a:xfrm>
-          <a:off x="0" y="0"/>
-          <a:ext cx="0" cy="0"/>
-          <a:chOff x="0" y="0"/>
-          <a:chExt cx="0" cy="0"/>
-        </a:xfrm>
-      </p:grpSpPr>
-      <p:pic>
-        <p:nvPicPr>
-          <p:cNvPr id="3073" name="Picture 1"/>
-          <p:cNvPicPr>
-            <a:picLocks noChangeAspect="1" noChangeArrowheads="1"/>
-          </p:cNvPicPr>
-          <p:nvPr/>
-        </p:nvPicPr>
-        <p:blipFill>
-          <a:blip r:embed="rId3">
-            <a:duotone>
-              <a:schemeClr val="accent5">
-                <a:shade val="45000"/>
-                <a:satMod val="135000"/>
-              </a:schemeClr>
-              <a:prstClr val="white"/>
-            </a:duotone>
-            <a:extLst>
-              <a:ext uri="{BEBA8EAE-BF5A-486C-A8C5-ECC9F3942E4B}">
-                <a14:imgProps xmlns:a14="http://schemas.microsoft.com/office/drawing/2010/main">
-                  <a14:imgLayer r:embed="rId4">
-                    <a14:imgEffect>
-                      <a14:brightnessContrast bright="20000"/>
-                    </a14:imgEffect>
-                  </a14:imgLayer>
-                </a14:imgProps>
-              </a:ext>
-              <a:ext uri="{28A0092B-C50C-407E-A947-70E740481C1C}">
-                <a14:useLocalDpi xmlns:a14="http://schemas.microsoft.com/office/drawing/2010/main" val="0"/>
-              </a:ext>
-            </a:extLst>
-          </a:blip>
-          <a:srcRect/>
-          <a:stretch>
-            <a:fillRect/>
-          </a:stretch>
-        </p:blipFill>
-        <p:spPr bwMode="auto">
-          <a:xfrm>
-            <a:off x="9784" y="-27384"/>
-            <a:ext cx="9179902" cy="6058927"/>
-          </a:xfrm>
-          <a:prstGeom prst="rect">
-            <a:avLst/>
-          </a:prstGeom>
-          <a:noFill/>
-          <a:ln>
-            <a:noFill/>
-          </a:ln>
-          <a:effectLst/>
-          <a:extLst>
-            <a:ext uri="{909E8E84-426E-40DD-AFC4-6F175D3DCCD1}">
-              <a14:hiddenFill xmlns:a14="http://schemas.microsoft.com/office/drawing/2010/main">
-                <a:solidFill>
-                  <a:schemeClr val="accent1"/>
-                </a:solidFill>
-              </a14:hiddenFill>
-            </a:ext>
-            <a:ext uri="{91240B29-F687-4F45-9708-019B960494DF}">
-              <a14:hiddenLine xmlns:a14="http://schemas.microsoft.com/office/drawing/2010/main" w="9525">
-                <a:solidFill>
-                  <a:schemeClr val="tx1"/>
-                </a:solidFill>
-                <a:miter lim="800000"/>
-                <a:headEnd/>
-                <a:tailEnd/>
-              </a14:hiddenLine>
-            </a:ext>
-            <a:ext uri="{AF507438-7753-43E0-B8FC-AC1667EBCBE1}">
-              <a14:hiddenEffects xmlns:a14="http://schemas.microsoft.com/office/drawing/2010/main">
-                <a:effectLst>
-                  <a:outerShdw dist="35921" dir="2700000" algn="ctr" rotWithShape="0">
-                    <a:schemeClr val="bg2"/>
-                  </a:outerShdw>
-                </a:effectLst>
-              </a14:hiddenEffects>
-            </a:ext>
-          </a:extLst>
-        </p:spPr>
-      </p:pic>
-      <p:sp>
-        <p:nvSpPr>
-          <p:cNvPr id="2" name="Rectangle 1"/>
-          <p:cNvSpPr>
-            <a:spLocks noGrp="1"/>
-          </p:cNvSpPr>
-          <p:nvPr>
-            <p:ph type="ctrTitle"/>
-          </p:nvPr>
-        </p:nvSpPr>
-        <p:spPr>
-          <a:xfrm>
-            <a:off x="0" y="2062155"/>
-            <a:ext cx="9144000" cy="1879848"/>
-          </a:xfrm>
-        </p:spPr>
-        <p:txBody>
-          <a:bodyPr anchor="ctr">
-            <a:noAutofit/>
-            <a:scene3d>
-              <a:camera prst="orthographicFront">
-                <a:rot lat="0" lon="0" rev="0"/>
-              </a:camera>
-              <a:lightRig rig="contrasting" dir="t">
-                <a:rot lat="0" lon="0" rev="4500000"/>
-              </a:lightRig>
-            </a:scene3d>
-            <a:sp3d contourW="6350" prstMaterial="metal">
-              <a:bevelT w="127000" h="31750" prst="relaxedInset"/>
-              <a:contourClr>
-                <a:schemeClr val="accent1">
-                  <a:shade val="75000"/>
-                </a:schemeClr>
-              </a:contourClr>
-            </a:sp3d>
-          </a:bodyPr>
-          <a:lstStyle/>
-          <a:p>
-            <a:pPr algn="ctr"/>
-            <a:r>
-              <a:rPr lang="en-US" sz="4000" dirty="0" err="1" smtClean="0">
-                <a:latin typeface="Times New Roman" pitchFamily="18" charset="0"/>
-                <a:cs typeface="Times New Roman" pitchFamily="18" charset="0"/>
-              </a:rPr>
-              <a:t>Xây</a:t>
-            </a:r>
-            <a:r>
-              <a:rPr lang="en-US" sz="4000" dirty="0" smtClean="0">
-                <a:latin typeface="Times New Roman" pitchFamily="18" charset="0"/>
-                <a:cs typeface="Times New Roman" pitchFamily="18" charset="0"/>
-              </a:rPr>
-              <a:t> </a:t>
-            </a:r>
-            <a:r>
-              <a:rPr lang="en-US" sz="4000" dirty="0" err="1" smtClean="0">
-                <a:latin typeface="Times New Roman" pitchFamily="18" charset="0"/>
-                <a:cs typeface="Times New Roman" pitchFamily="18" charset="0"/>
-              </a:rPr>
-              <a:t>dựng</a:t>
-            </a:r>
-            <a:r>
-              <a:rPr lang="en-US" sz="4000" dirty="0" smtClean="0">
-                <a:latin typeface="Times New Roman" pitchFamily="18" charset="0"/>
-                <a:cs typeface="Times New Roman" pitchFamily="18" charset="0"/>
-              </a:rPr>
-              <a:t> </a:t>
-            </a:r>
-            <a:r>
-              <a:rPr lang="en-US" sz="4000" dirty="0" err="1" smtClean="0">
-                <a:latin typeface="Times New Roman" pitchFamily="18" charset="0"/>
-                <a:cs typeface="Times New Roman" pitchFamily="18" charset="0"/>
-              </a:rPr>
-              <a:t>kiến</a:t>
-            </a:r>
-            <a:r>
-              <a:rPr lang="en-US" sz="4000" dirty="0" smtClean="0">
-                <a:latin typeface="Times New Roman" pitchFamily="18" charset="0"/>
-                <a:cs typeface="Times New Roman" pitchFamily="18" charset="0"/>
-              </a:rPr>
-              <a:t> </a:t>
-            </a:r>
-            <a:r>
-              <a:rPr lang="en-US" sz="4000" dirty="0" err="1" smtClean="0">
-                <a:latin typeface="Times New Roman" pitchFamily="18" charset="0"/>
-                <a:cs typeface="Times New Roman" pitchFamily="18" charset="0"/>
-              </a:rPr>
-              <a:t>trúc</a:t>
-            </a:r>
-            <a:r>
-              <a:rPr lang="en-US" sz="4000" dirty="0" smtClean="0">
-                <a:latin typeface="Times New Roman" pitchFamily="18" charset="0"/>
-                <a:cs typeface="Times New Roman" pitchFamily="18" charset="0"/>
-              </a:rPr>
-              <a:t/>
-            </a:r>
-            <a:br>
-              <a:rPr lang="en-US" sz="4000" dirty="0" smtClean="0">
-                <a:latin typeface="Times New Roman" pitchFamily="18" charset="0"/>
-                <a:cs typeface="Times New Roman" pitchFamily="18" charset="0"/>
-              </a:rPr>
-            </a:br>
-            <a:r>
-              <a:rPr lang="en-US" sz="4000" dirty="0" err="1" smtClean="0">
-                <a:latin typeface="Times New Roman" pitchFamily="18" charset="0"/>
-                <a:cs typeface="Times New Roman" pitchFamily="18" charset="0"/>
-              </a:rPr>
-              <a:t>cổng</a:t>
-            </a:r>
-            <a:r>
-              <a:rPr lang="en-US" sz="4000" dirty="0" smtClean="0">
-                <a:latin typeface="Times New Roman" pitchFamily="18" charset="0"/>
-                <a:cs typeface="Times New Roman" pitchFamily="18" charset="0"/>
-              </a:rPr>
-              <a:t> </a:t>
-            </a:r>
-            <a:r>
-              <a:rPr lang="en-US" sz="4000" dirty="0" err="1" smtClean="0">
-                <a:latin typeface="Times New Roman" pitchFamily="18" charset="0"/>
-                <a:cs typeface="Times New Roman" pitchFamily="18" charset="0"/>
-              </a:rPr>
-              <a:t>thông</a:t>
-            </a:r>
-            <a:r>
-              <a:rPr lang="en-US" sz="4000" dirty="0" smtClean="0">
-                <a:latin typeface="Times New Roman" pitchFamily="18" charset="0"/>
-                <a:cs typeface="Times New Roman" pitchFamily="18" charset="0"/>
-              </a:rPr>
-              <a:t> tin </a:t>
-            </a:r>
-            <a:r>
-              <a:rPr lang="en-US" sz="4000" dirty="0" err="1" smtClean="0">
-                <a:latin typeface="Times New Roman" pitchFamily="18" charset="0"/>
-                <a:cs typeface="Times New Roman" pitchFamily="18" charset="0"/>
-              </a:rPr>
-              <a:t>tìm</a:t>
-            </a:r>
-            <a:r>
-              <a:rPr lang="en-US" sz="4000" dirty="0" smtClean="0">
-                <a:latin typeface="Times New Roman" pitchFamily="18" charset="0"/>
-                <a:cs typeface="Times New Roman" pitchFamily="18" charset="0"/>
-              </a:rPr>
-              <a:t> </a:t>
-            </a:r>
-            <a:r>
-              <a:rPr lang="en-US" sz="4000" dirty="0" err="1" smtClean="0">
-                <a:latin typeface="Times New Roman" pitchFamily="18" charset="0"/>
-                <a:cs typeface="Times New Roman" pitchFamily="18" charset="0"/>
-              </a:rPr>
-              <a:t>việc</a:t>
-            </a:r>
-            <a:endParaRPr lang="en-US" sz="4800" dirty="0">
-              <a:latin typeface="Times New Roman" pitchFamily="18" charset="0"/>
-              <a:cs typeface="Times New Roman" pitchFamily="18" charset="0"/>
-            </a:endParaRPr>
-          </a:p>
-        </p:txBody>
-      </p:sp>
-      <p:sp>
-        <p:nvSpPr>
-          <p:cNvPr id="3" name="Rectangle 2"/>
-          <p:cNvSpPr>
-            <a:spLocks noGrp="1"/>
-          </p:cNvSpPr>
-          <p:nvPr>
-            <p:ph type="subTitle" idx="1"/>
-          </p:nvPr>
-        </p:nvSpPr>
-        <p:spPr>
-          <a:xfrm>
-            <a:off x="-5444" y="6069023"/>
-            <a:ext cx="2201180" cy="685800"/>
-          </a:xfrm>
-        </p:spPr>
-        <p:txBody>
-          <a:bodyPr>
-            <a:normAutofit/>
-          </a:bodyPr>
-          <a:lstStyle/>
-          <a:p>
-            <a:pPr algn="ctr"/>
-            <a:r>
-              <a:rPr lang="en-US" dirty="0" smtClean="0"/>
-              <a:t>07/01/2012</a:t>
-            </a:r>
-          </a:p>
-        </p:txBody>
-      </p:sp>
-      <p:pic>
-        <p:nvPicPr>
-          <p:cNvPr id="6" name="Picture 5" descr="logoVNbottom.wmf"/>
-          <p:cNvPicPr>
-            <a:picLocks noChangeAspect="1"/>
-          </p:cNvPicPr>
-          <p:nvPr/>
-        </p:nvPicPr>
-        <p:blipFill>
-          <a:blip r:embed="rId5" cstate="print">
-            <a:duotone>
-              <a:schemeClr val="accent2">
-                <a:shade val="45000"/>
-                <a:satMod val="135000"/>
-              </a:schemeClr>
-              <a:prstClr val="white"/>
-            </a:duotone>
-            <a:lum contrast="-40000"/>
-          </a:blip>
-          <a:stretch>
-            <a:fillRect/>
-          </a:stretch>
-        </p:blipFill>
-        <p:spPr>
-          <a:xfrm>
-            <a:off x="323529" y="305063"/>
-            <a:ext cx="2520281" cy="1157237"/>
-          </a:xfrm>
-          <a:prstGeom prst="rect">
-            <a:avLst/>
-          </a:prstGeom>
-        </p:spPr>
-      </p:pic>
-      <p:sp>
-        <p:nvSpPr>
-          <p:cNvPr id="5" name="Rectangle 1"/>
-          <p:cNvSpPr txBox="1">
-            <a:spLocks/>
-          </p:cNvSpPr>
-          <p:nvPr/>
-        </p:nvSpPr>
-        <p:spPr>
-          <a:xfrm>
-            <a:off x="2339752" y="6031543"/>
-            <a:ext cx="4806752" cy="692696"/>
-          </a:xfrm>
-          <a:prstGeom prst="rect">
-            <a:avLst/>
-          </a:prstGeom>
-        </p:spPr>
-        <p:txBody>
-          <a:bodyPr vert="horz" anchor="ctr">
-            <a:noAutofit/>
-          </a:bodyPr>
-          <a:lstStyle>
-            <a:lvl1pPr algn="l" rtl="0" eaLnBrk="1" latinLnBrk="0" hangingPunct="1">
-              <a:spcBef>
-                <a:spcPct val="0"/>
-              </a:spcBef>
-              <a:buNone/>
-              <a:defRPr sz="4400" kern="1200" cap="all" baseline="0">
-                <a:solidFill>
-                  <a:schemeClr val="tx2"/>
-                </a:solidFill>
-                <a:latin typeface="+mj-lt"/>
-                <a:ea typeface="+mj-ea"/>
-                <a:cs typeface="+mj-cs"/>
-              </a:defRPr>
-            </a:lvl1pPr>
-          </a:lstStyle>
-          <a:p>
-            <a:pPr algn="ctr"/>
-            <a:r>
-              <a:rPr lang="en-US" sz="2800" cap="none" dirty="0" smtClean="0">
-                <a:ln w="18415" cmpd="sng">
-                  <a:solidFill>
-                    <a:srgbClr val="FFFFFF"/>
-                  </a:solidFill>
-                  <a:prstDash val="solid"/>
-                </a:ln>
-                <a:solidFill>
-                  <a:srgbClr val="FFFFFF"/>
-                </a:solidFill>
-                <a:effectLst>
-                  <a:outerShdw blurRad="63500" dir="3600000" algn="tl" rotWithShape="0">
-                    <a:srgbClr val="000000">
-                      <a:alpha val="70000"/>
-                    </a:srgbClr>
-                  </a:outerShdw>
-                </a:effectLst>
-                <a:latin typeface="Times New Roman" pitchFamily="18" charset="0"/>
-                <a:cs typeface="Times New Roman" pitchFamily="18" charset="0"/>
-              </a:rPr>
-              <a:t>KHOÁ LUẬN TỐT NGHIỆP</a:t>
-            </a:r>
-            <a:endParaRPr lang="en-US" sz="3600" cap="none" dirty="0">
-              <a:ln w="18415" cmpd="sng">
-                <a:solidFill>
-                  <a:srgbClr val="FFFFFF"/>
-                </a:solidFill>
-                <a:prstDash val="solid"/>
-              </a:ln>
-              <a:solidFill>
-                <a:srgbClr val="FFFFFF"/>
-              </a:solidFill>
-              <a:effectLst>
-                <a:outerShdw blurRad="63500" dir="3600000" algn="tl" rotWithShape="0">
-                  <a:srgbClr val="000000">
-                    <a:alpha val="70000"/>
-                  </a:srgbClr>
-                </a:outerShdw>
-              </a:effectLst>
-              <a:latin typeface="Times New Roman" pitchFamily="18" charset="0"/>
-              <a:cs typeface="Times New Roman" pitchFamily="18" charset="0"/>
-            </a:endParaRPr>
-          </a:p>
-        </p:txBody>
-      </p:sp>
-      <p:sp>
-        <p:nvSpPr>
-          <p:cNvPr id="7" name="Rectangle 1"/>
-          <p:cNvSpPr txBox="1">
-            <a:spLocks/>
-          </p:cNvSpPr>
-          <p:nvPr/>
-        </p:nvSpPr>
-        <p:spPr>
-          <a:xfrm>
-            <a:off x="0" y="4005064"/>
-            <a:ext cx="9144000" cy="1879848"/>
-          </a:xfrm>
-          <a:prstGeom prst="rect">
-            <a:avLst/>
-          </a:prstGeom>
-        </p:spPr>
-        <p:txBody>
-          <a:bodyPr vert="horz" anchor="ctr">
-            <a:noAutofit/>
-            <a:scene3d>
-              <a:camera prst="orthographicFront">
-                <a:rot lat="0" lon="0" rev="0"/>
-              </a:camera>
-              <a:lightRig rig="contrasting" dir="t">
-                <a:rot lat="0" lon="0" rev="4500000"/>
-              </a:lightRig>
-            </a:scene3d>
-            <a:sp3d contourW="6350" prstMaterial="metal">
-              <a:bevelT w="127000" h="31750" prst="relaxedInset"/>
-              <a:contourClr>
-                <a:schemeClr val="accent1">
-                  <a:shade val="75000"/>
-                </a:schemeClr>
-              </a:contourClr>
-            </a:sp3d>
-          </a:bodyPr>
-          <a:lstStyle>
-            <a:lvl1pPr algn="l" rtl="0" eaLnBrk="1" latinLnBrk="0" hangingPunct="1">
-              <a:spcBef>
-                <a:spcPct val="0"/>
-              </a:spcBef>
-              <a:buNone/>
-              <a:defRPr sz="4400" b="1" kern="1200" cap="all" spc="0" baseline="0">
-                <a:ln w="0"/>
-                <a:gradFill flip="none">
-                  <a:gsLst>
-                    <a:gs pos="0">
-                      <a:schemeClr val="accent1">
-                        <a:tint val="75000"/>
-                        <a:shade val="75000"/>
-                        <a:satMod val="170000"/>
-                      </a:schemeClr>
-                    </a:gs>
-                    <a:gs pos="49000">
-                      <a:schemeClr val="accent1">
-                        <a:tint val="88000"/>
-                        <a:shade val="65000"/>
-                        <a:satMod val="172000"/>
-                      </a:schemeClr>
-                    </a:gs>
-                    <a:gs pos="50000">
-                      <a:schemeClr val="accent1">
-                        <a:shade val="65000"/>
-                        <a:satMod val="130000"/>
-                      </a:schemeClr>
-                    </a:gs>
-                    <a:gs pos="92000">
-                      <a:schemeClr val="accent1">
-                        <a:shade val="50000"/>
-                        <a:satMod val="120000"/>
-                      </a:schemeClr>
-                    </a:gs>
-                    <a:gs pos="100000">
-                      <a:schemeClr val="accent1">
-                        <a:shade val="48000"/>
-                        <a:satMod val="120000"/>
-                      </a:schemeClr>
-                    </a:gs>
-                  </a:gsLst>
-                  <a:lin ang="5400000"/>
-                </a:gradFill>
-                <a:effectLst>
-                  <a:reflection blurRad="12700" stA="50000" endPos="50000" dist="5000" dir="5400000" sy="-100000" rotWithShape="0"/>
-                </a:effectLst>
-                <a:latin typeface="Times New Roman" pitchFamily="18" charset="0"/>
-                <a:ea typeface="+mj-ea"/>
-                <a:cs typeface="Times New Roman" pitchFamily="18" charset="0"/>
-              </a:defRPr>
-            </a:lvl1pPr>
-          </a:lstStyle>
-          <a:p>
-            <a:pPr>
-              <a:lnSpc>
-                <a:spcPct val="150000"/>
-              </a:lnSpc>
-            </a:pPr>
-            <a:r>
-              <a:rPr lang="en-US" sz="2200" dirty="0" smtClean="0">
-                <a:effectLst/>
-              </a:rPr>
-              <a:t>	GIẢNG VIÊN HƯỚNG DẪN:	 TS. </a:t>
-            </a:r>
-            <a:r>
-              <a:rPr lang="en-US" sz="2200" dirty="0" err="1" smtClean="0">
-                <a:effectLst/>
-              </a:rPr>
-              <a:t>Trần</a:t>
-            </a:r>
-            <a:r>
-              <a:rPr lang="en-US" sz="2200" dirty="0" smtClean="0">
-                <a:effectLst/>
-              </a:rPr>
-              <a:t> </a:t>
-            </a:r>
-            <a:r>
-              <a:rPr lang="en-US" sz="2200" dirty="0" err="1" smtClean="0">
-                <a:effectLst/>
-              </a:rPr>
-              <a:t>vũ</a:t>
-            </a:r>
-            <a:r>
-              <a:rPr lang="en-US" sz="2200" dirty="0" smtClean="0">
-                <a:effectLst/>
-              </a:rPr>
-              <a:t> </a:t>
-            </a:r>
-            <a:r>
-              <a:rPr lang="en-US" sz="2200" dirty="0" err="1" smtClean="0">
-                <a:effectLst/>
-              </a:rPr>
-              <a:t>bình</a:t>
-            </a:r>
-            <a:endParaRPr lang="en-US" sz="2200" dirty="0" smtClean="0">
-              <a:effectLst/>
-            </a:endParaRPr>
-          </a:p>
-          <a:p>
-            <a:pPr>
-              <a:lnSpc>
-                <a:spcPct val="150000"/>
-              </a:lnSpc>
-            </a:pPr>
-            <a:r>
-              <a:rPr lang="en-US" sz="2200" dirty="0" smtClean="0">
-                <a:effectLst/>
-              </a:rPr>
-              <a:t>	</a:t>
-            </a:r>
-            <a:r>
-              <a:rPr lang="en-US" sz="2200" dirty="0" err="1" smtClean="0">
-                <a:effectLst/>
-              </a:rPr>
-              <a:t>Sinh</a:t>
-            </a:r>
-            <a:r>
-              <a:rPr lang="en-US" sz="2200" dirty="0" smtClean="0">
-                <a:effectLst/>
-              </a:rPr>
-              <a:t> </a:t>
-            </a:r>
-            <a:r>
-              <a:rPr lang="en-US" sz="2200" dirty="0" err="1" smtClean="0">
-                <a:effectLst/>
-              </a:rPr>
-              <a:t>viên</a:t>
-            </a:r>
-            <a:r>
-              <a:rPr lang="en-US" sz="2200" dirty="0" smtClean="0">
-                <a:effectLst/>
-              </a:rPr>
-              <a:t> </a:t>
-            </a:r>
-            <a:r>
-              <a:rPr lang="en-US" sz="2200" dirty="0" err="1" smtClean="0">
-                <a:effectLst/>
-              </a:rPr>
-              <a:t>thực</a:t>
-            </a:r>
-            <a:r>
-              <a:rPr lang="en-US" sz="2200" dirty="0" smtClean="0">
-                <a:effectLst/>
-              </a:rPr>
-              <a:t> </a:t>
-            </a:r>
-            <a:r>
-              <a:rPr lang="en-US" sz="2200" dirty="0" err="1" smtClean="0">
-                <a:effectLst/>
-              </a:rPr>
-              <a:t>hiện</a:t>
-            </a:r>
-            <a:r>
-              <a:rPr lang="en-US" sz="2200" dirty="0" smtClean="0">
-                <a:effectLst/>
-              </a:rPr>
-              <a:t>:	</a:t>
-            </a:r>
-            <a:r>
-              <a:rPr lang="en-US" sz="2200" dirty="0" err="1" smtClean="0">
-                <a:effectLst/>
-              </a:rPr>
-              <a:t>lê</a:t>
-            </a:r>
-            <a:r>
-              <a:rPr lang="en-US" sz="2200" dirty="0" smtClean="0">
-                <a:effectLst/>
-              </a:rPr>
-              <a:t> </a:t>
-            </a:r>
-            <a:r>
-              <a:rPr lang="en-US" sz="2200" dirty="0" err="1" smtClean="0">
-                <a:effectLst/>
-              </a:rPr>
-              <a:t>trung</a:t>
-            </a:r>
-            <a:r>
-              <a:rPr lang="en-US" sz="2200" dirty="0" smtClean="0">
-                <a:effectLst/>
-              </a:rPr>
-              <a:t> </a:t>
-            </a:r>
-            <a:r>
-              <a:rPr lang="en-US" sz="2200" dirty="0" err="1" smtClean="0">
-                <a:effectLst/>
-              </a:rPr>
-              <a:t>hiếu</a:t>
-            </a:r>
-            <a:endParaRPr lang="en-US" sz="2200" dirty="0" smtClean="0">
-              <a:effectLst/>
-            </a:endParaRPr>
-          </a:p>
-          <a:p>
-            <a:pPr>
-              <a:lnSpc>
-                <a:spcPct val="150000"/>
-              </a:lnSpc>
-            </a:pPr>
-            <a:r>
-              <a:rPr lang="en-US" sz="2200" dirty="0" smtClean="0">
-                <a:effectLst/>
-              </a:rPr>
-              <a:t>					</a:t>
-            </a:r>
-            <a:r>
-              <a:rPr lang="en-US" sz="2200" dirty="0" err="1" smtClean="0">
-                <a:effectLst/>
-              </a:rPr>
-              <a:t>Phùng</a:t>
-            </a:r>
-            <a:r>
-              <a:rPr lang="en-US" sz="2200" dirty="0" smtClean="0">
-                <a:effectLst/>
-              </a:rPr>
-              <a:t> </a:t>
-            </a:r>
-            <a:r>
-              <a:rPr lang="en-US" sz="2200" dirty="0" err="1" smtClean="0">
-                <a:effectLst/>
-              </a:rPr>
-              <a:t>chí</a:t>
-            </a:r>
-            <a:r>
-              <a:rPr lang="en-US" sz="2200" dirty="0" smtClean="0">
-                <a:effectLst/>
-              </a:rPr>
-              <a:t> </a:t>
-            </a:r>
-            <a:r>
-              <a:rPr lang="en-US" sz="2200" dirty="0" err="1" smtClean="0">
-                <a:effectLst/>
-              </a:rPr>
-              <a:t>nguyên</a:t>
-            </a:r>
-            <a:endParaRPr lang="en-US" sz="2200" dirty="0" smtClean="0">
-              <a:effectLst/>
-            </a:endParaRPr>
-          </a:p>
-          <a:p>
-            <a:pPr>
-              <a:lnSpc>
-                <a:spcPct val="150000"/>
-              </a:lnSpc>
-            </a:pPr>
-            <a:r>
-              <a:rPr lang="en-US" sz="2200" dirty="0" smtClean="0">
-                <a:effectLst/>
-              </a:rPr>
-              <a:t>					</a:t>
-            </a:r>
-            <a:r>
-              <a:rPr lang="en-US" sz="2200" dirty="0" err="1" smtClean="0">
-                <a:effectLst/>
-              </a:rPr>
-              <a:t>Lê</a:t>
-            </a:r>
-            <a:r>
-              <a:rPr lang="en-US" sz="2200" dirty="0" smtClean="0">
-                <a:effectLst/>
-              </a:rPr>
-              <a:t> </a:t>
-            </a:r>
-            <a:r>
-              <a:rPr lang="en-US" sz="2200" dirty="0" err="1" smtClean="0">
-                <a:effectLst/>
-              </a:rPr>
-              <a:t>dương</a:t>
-            </a:r>
-            <a:r>
-              <a:rPr lang="en-US" sz="2200" dirty="0" smtClean="0">
-                <a:effectLst/>
-              </a:rPr>
-              <a:t> </a:t>
-            </a:r>
-            <a:r>
-              <a:rPr lang="en-US" sz="2200" dirty="0" err="1" smtClean="0">
-                <a:effectLst/>
-              </a:rPr>
-              <a:t>công</a:t>
-            </a:r>
-            <a:r>
-              <a:rPr lang="en-US" sz="2200" dirty="0" smtClean="0">
-                <a:effectLst/>
-              </a:rPr>
-              <a:t> </a:t>
-            </a:r>
-            <a:r>
-              <a:rPr lang="en-US" sz="2200" dirty="0" err="1" smtClean="0">
-                <a:effectLst/>
-              </a:rPr>
-              <a:t>phúc</a:t>
-            </a:r>
-            <a:endParaRPr lang="en-US" sz="2200" dirty="0" smtClean="0">
-              <a:effectLst/>
-            </a:endParaRPr>
-          </a:p>
-        </p:txBody>
-      </p:sp>
-    </p:spTree>
-  </p:cSld>
-  <p:clrMapOvr>
-    <a:masterClrMapping/>
-  </p:clrMapOvr>
-  <mc:AlternateContent xmlns:mc="http://schemas.openxmlformats.org/markup-compatibility/2006" xmlns:p14="http://schemas.microsoft.com/office/powerpoint/2010/main">
-    <mc:Choice Requires="p14">
-      <p:transition p14:dur="0"/>
-    </mc:Choice>
-    <mc:Fallback xmlns="">
-      <p:transition/>
-    </mc:Fallback>
-  </mc:AlternateContent>
-  <p:timing>
-    <p:tnLst>
-      <p:par>
-        <p:cTn id="1" dur="indefinite" restart="never" nodeType="tmRoot"/>
-      </p:par>
-    </p:tnLst>
-  </p:timing>
-</p:sld>
-</file>
-
-<file path=ppt/slides/slide20.xml><?xml version="1.0" encoding="utf-8"?>
+<file path=ppt/slides/slide19.xml><?xml version="1.0" encoding="utf-8"?>
 <p:sld xmlns:a="http://schemas.openxmlformats.org/drawingml/2006/main" xmlns:r="http://schemas.openxmlformats.org/officeDocument/2006/relationships" xmlns:p="http://schemas.openxmlformats.org/presentationml/2006/main">
   <p:cSld>
     <p:spTree>
@@ -12255,7 +11589,7 @@
             <a:fld id="{1AD93096-5B34-4342-9326-69289CEAE4C2}" type="slidenum">
               <a:rPr lang="en-US" smtClean="0"/>
               <a:pPr/>
-              <a:t>20</a:t>
+              <a:t>19</a:t>
             </a:fld>
             <a:endParaRPr lang="en-US" dirty="0">
               <a:solidFill>
@@ -13498,7 +12832,769 @@
 </p:sld>
 </file>
 
-<file path=ppt/slides/slide21.xml><?xml version="1.0" encoding="utf-8"?>
+<file path=ppt/slides/slide2.xml><?xml version="1.0" encoding="utf-8"?>
+<p:sld xmlns:a="http://schemas.openxmlformats.org/drawingml/2006/main" xmlns:r="http://schemas.openxmlformats.org/officeDocument/2006/relationships" xmlns:p="http://schemas.openxmlformats.org/presentationml/2006/main">
+  <p:cSld>
+    <p:spTree>
+      <p:nvGrpSpPr>
+        <p:cNvPr id="1" name=""/>
+        <p:cNvGrpSpPr/>
+        <p:nvPr/>
+      </p:nvGrpSpPr>
+      <p:grpSpPr>
+        <a:xfrm>
+          <a:off x="0" y="0"/>
+          <a:ext cx="0" cy="0"/>
+          <a:chOff x="0" y="0"/>
+          <a:chExt cx="0" cy="0"/>
+        </a:xfrm>
+      </p:grpSpPr>
+      <p:pic>
+        <p:nvPicPr>
+          <p:cNvPr id="3073" name="Picture 1"/>
+          <p:cNvPicPr>
+            <a:picLocks noChangeAspect="1" noChangeArrowheads="1"/>
+          </p:cNvPicPr>
+          <p:nvPr/>
+        </p:nvPicPr>
+        <p:blipFill>
+          <a:blip r:embed="rId3">
+            <a:duotone>
+              <a:schemeClr val="accent5">
+                <a:shade val="45000"/>
+                <a:satMod val="135000"/>
+              </a:schemeClr>
+              <a:prstClr val="white"/>
+            </a:duotone>
+            <a:extLst>
+              <a:ext uri="{BEBA8EAE-BF5A-486C-A8C5-ECC9F3942E4B}">
+                <a14:imgProps xmlns:a14="http://schemas.microsoft.com/office/drawing/2010/main">
+                  <a14:imgLayer r:embed="rId4">
+                    <a14:imgEffect>
+                      <a14:brightnessContrast bright="20000"/>
+                    </a14:imgEffect>
+                  </a14:imgLayer>
+                </a14:imgProps>
+              </a:ext>
+              <a:ext uri="{28A0092B-C50C-407E-A947-70E740481C1C}">
+                <a14:useLocalDpi xmlns:a14="http://schemas.microsoft.com/office/drawing/2010/main" val="0"/>
+              </a:ext>
+            </a:extLst>
+          </a:blip>
+          <a:srcRect/>
+          <a:stretch>
+            <a:fillRect/>
+          </a:stretch>
+        </p:blipFill>
+        <p:spPr bwMode="auto">
+          <a:xfrm>
+            <a:off x="9784" y="-27384"/>
+            <a:ext cx="9179902" cy="6058927"/>
+          </a:xfrm>
+          <a:prstGeom prst="rect">
+            <a:avLst/>
+          </a:prstGeom>
+          <a:noFill/>
+          <a:ln>
+            <a:noFill/>
+          </a:ln>
+          <a:effectLst/>
+          <a:extLst>
+            <a:ext uri="{909E8E84-426E-40DD-AFC4-6F175D3DCCD1}">
+              <a14:hiddenFill xmlns:a14="http://schemas.microsoft.com/office/drawing/2010/main">
+                <a:solidFill>
+                  <a:schemeClr val="accent1"/>
+                </a:solidFill>
+              </a14:hiddenFill>
+            </a:ext>
+            <a:ext uri="{91240B29-F687-4F45-9708-019B960494DF}">
+              <a14:hiddenLine xmlns:a14="http://schemas.microsoft.com/office/drawing/2010/main" w="9525">
+                <a:solidFill>
+                  <a:schemeClr val="tx1"/>
+                </a:solidFill>
+                <a:miter lim="800000"/>
+                <a:headEnd/>
+                <a:tailEnd/>
+              </a14:hiddenLine>
+            </a:ext>
+            <a:ext uri="{AF507438-7753-43E0-B8FC-AC1667EBCBE1}">
+              <a14:hiddenEffects xmlns:a14="http://schemas.microsoft.com/office/drawing/2010/main">
+                <a:effectLst>
+                  <a:outerShdw dist="35921" dir="2700000" algn="ctr" rotWithShape="0">
+                    <a:schemeClr val="bg2"/>
+                  </a:outerShdw>
+                </a:effectLst>
+              </a14:hiddenEffects>
+            </a:ext>
+          </a:extLst>
+        </p:spPr>
+      </p:pic>
+      <p:sp>
+        <p:nvSpPr>
+          <p:cNvPr id="2" name="Rectangle 1"/>
+          <p:cNvSpPr>
+            <a:spLocks noGrp="1"/>
+          </p:cNvSpPr>
+          <p:nvPr>
+            <p:ph type="ctrTitle"/>
+          </p:nvPr>
+        </p:nvSpPr>
+        <p:spPr>
+          <a:xfrm>
+            <a:off x="0" y="2062155"/>
+            <a:ext cx="9144000" cy="1879848"/>
+          </a:xfrm>
+        </p:spPr>
+        <p:txBody>
+          <a:bodyPr anchor="ctr">
+            <a:noAutofit/>
+            <a:scene3d>
+              <a:camera prst="orthographicFront">
+                <a:rot lat="0" lon="0" rev="0"/>
+              </a:camera>
+              <a:lightRig rig="contrasting" dir="t">
+                <a:rot lat="0" lon="0" rev="4500000"/>
+              </a:lightRig>
+            </a:scene3d>
+            <a:sp3d contourW="6350" prstMaterial="metal">
+              <a:bevelT w="127000" h="31750" prst="relaxedInset"/>
+              <a:contourClr>
+                <a:schemeClr val="accent1">
+                  <a:shade val="75000"/>
+                </a:schemeClr>
+              </a:contourClr>
+            </a:sp3d>
+          </a:bodyPr>
+          <a:lstStyle/>
+          <a:p>
+            <a:pPr algn="ctr"/>
+            <a:r>
+              <a:rPr lang="en-US" sz="4000" dirty="0" err="1" smtClean="0">
+                <a:latin typeface="Times New Roman" pitchFamily="18" charset="0"/>
+                <a:cs typeface="Times New Roman" pitchFamily="18" charset="0"/>
+              </a:rPr>
+              <a:t>Xây</a:t>
+            </a:r>
+            <a:r>
+              <a:rPr lang="en-US" sz="4000" dirty="0" smtClean="0">
+                <a:latin typeface="Times New Roman" pitchFamily="18" charset="0"/>
+                <a:cs typeface="Times New Roman" pitchFamily="18" charset="0"/>
+              </a:rPr>
+              <a:t> </a:t>
+            </a:r>
+            <a:r>
+              <a:rPr lang="en-US" sz="4000" dirty="0" err="1" smtClean="0">
+                <a:latin typeface="Times New Roman" pitchFamily="18" charset="0"/>
+                <a:cs typeface="Times New Roman" pitchFamily="18" charset="0"/>
+              </a:rPr>
+              <a:t>dựng</a:t>
+            </a:r>
+            <a:r>
+              <a:rPr lang="en-US" sz="4000" dirty="0" smtClean="0">
+                <a:latin typeface="Times New Roman" pitchFamily="18" charset="0"/>
+                <a:cs typeface="Times New Roman" pitchFamily="18" charset="0"/>
+              </a:rPr>
+              <a:t> </a:t>
+            </a:r>
+            <a:r>
+              <a:rPr lang="en-US" sz="4000" dirty="0" err="1" smtClean="0">
+                <a:latin typeface="Times New Roman" pitchFamily="18" charset="0"/>
+                <a:cs typeface="Times New Roman" pitchFamily="18" charset="0"/>
+              </a:rPr>
+              <a:t>kiến</a:t>
+            </a:r>
+            <a:r>
+              <a:rPr lang="en-US" sz="4000" dirty="0" smtClean="0">
+                <a:latin typeface="Times New Roman" pitchFamily="18" charset="0"/>
+                <a:cs typeface="Times New Roman" pitchFamily="18" charset="0"/>
+              </a:rPr>
+              <a:t> </a:t>
+            </a:r>
+            <a:r>
+              <a:rPr lang="en-US" sz="4000" dirty="0" err="1" smtClean="0">
+                <a:latin typeface="Times New Roman" pitchFamily="18" charset="0"/>
+                <a:cs typeface="Times New Roman" pitchFamily="18" charset="0"/>
+              </a:rPr>
+              <a:t>trúc</a:t>
+            </a:r>
+            <a:r>
+              <a:rPr lang="en-US" sz="4000" dirty="0" smtClean="0">
+                <a:latin typeface="Times New Roman" pitchFamily="18" charset="0"/>
+                <a:cs typeface="Times New Roman" pitchFamily="18" charset="0"/>
+              </a:rPr>
+              <a:t/>
+            </a:r>
+            <a:br>
+              <a:rPr lang="en-US" sz="4000" dirty="0" smtClean="0">
+                <a:latin typeface="Times New Roman" pitchFamily="18" charset="0"/>
+                <a:cs typeface="Times New Roman" pitchFamily="18" charset="0"/>
+              </a:rPr>
+            </a:br>
+            <a:r>
+              <a:rPr lang="en-US" sz="4000" dirty="0" err="1" smtClean="0">
+                <a:latin typeface="Times New Roman" pitchFamily="18" charset="0"/>
+                <a:cs typeface="Times New Roman" pitchFamily="18" charset="0"/>
+              </a:rPr>
+              <a:t>cổng</a:t>
+            </a:r>
+            <a:r>
+              <a:rPr lang="en-US" sz="4000" dirty="0" smtClean="0">
+                <a:latin typeface="Times New Roman" pitchFamily="18" charset="0"/>
+                <a:cs typeface="Times New Roman" pitchFamily="18" charset="0"/>
+              </a:rPr>
+              <a:t> </a:t>
+            </a:r>
+            <a:r>
+              <a:rPr lang="en-US" sz="4000" dirty="0" err="1" smtClean="0">
+                <a:latin typeface="Times New Roman" pitchFamily="18" charset="0"/>
+                <a:cs typeface="Times New Roman" pitchFamily="18" charset="0"/>
+              </a:rPr>
+              <a:t>thông</a:t>
+            </a:r>
+            <a:r>
+              <a:rPr lang="en-US" sz="4000" dirty="0" smtClean="0">
+                <a:latin typeface="Times New Roman" pitchFamily="18" charset="0"/>
+                <a:cs typeface="Times New Roman" pitchFamily="18" charset="0"/>
+              </a:rPr>
+              <a:t> tin </a:t>
+            </a:r>
+            <a:r>
+              <a:rPr lang="en-US" sz="4000" dirty="0" err="1" smtClean="0">
+                <a:latin typeface="Times New Roman" pitchFamily="18" charset="0"/>
+                <a:cs typeface="Times New Roman" pitchFamily="18" charset="0"/>
+              </a:rPr>
+              <a:t>tìm</a:t>
+            </a:r>
+            <a:r>
+              <a:rPr lang="en-US" sz="4000" dirty="0" smtClean="0">
+                <a:latin typeface="Times New Roman" pitchFamily="18" charset="0"/>
+                <a:cs typeface="Times New Roman" pitchFamily="18" charset="0"/>
+              </a:rPr>
+              <a:t> </a:t>
+            </a:r>
+            <a:r>
+              <a:rPr lang="en-US" sz="4000" dirty="0" err="1" smtClean="0">
+                <a:latin typeface="Times New Roman" pitchFamily="18" charset="0"/>
+                <a:cs typeface="Times New Roman" pitchFamily="18" charset="0"/>
+              </a:rPr>
+              <a:t>việc</a:t>
+            </a:r>
+            <a:endParaRPr lang="en-US" sz="4800" dirty="0">
+              <a:latin typeface="Times New Roman" pitchFamily="18" charset="0"/>
+              <a:cs typeface="Times New Roman" pitchFamily="18" charset="0"/>
+            </a:endParaRPr>
+          </a:p>
+        </p:txBody>
+      </p:sp>
+      <p:sp>
+        <p:nvSpPr>
+          <p:cNvPr id="3" name="Rectangle 2"/>
+          <p:cNvSpPr>
+            <a:spLocks noGrp="1"/>
+          </p:cNvSpPr>
+          <p:nvPr>
+            <p:ph type="subTitle" idx="1"/>
+          </p:nvPr>
+        </p:nvSpPr>
+        <p:spPr>
+          <a:xfrm>
+            <a:off x="-5444" y="6069023"/>
+            <a:ext cx="2201180" cy="685800"/>
+          </a:xfrm>
+        </p:spPr>
+        <p:txBody>
+          <a:bodyPr>
+            <a:normAutofit/>
+          </a:bodyPr>
+          <a:lstStyle/>
+          <a:p>
+            <a:pPr algn="ctr"/>
+            <a:r>
+              <a:rPr lang="en-US" dirty="0" smtClean="0"/>
+              <a:t>07/01/2012</a:t>
+            </a:r>
+          </a:p>
+        </p:txBody>
+      </p:sp>
+      <p:pic>
+        <p:nvPicPr>
+          <p:cNvPr id="6" name="Picture 5" descr="logoVNbottom.wmf"/>
+          <p:cNvPicPr>
+            <a:picLocks noChangeAspect="1"/>
+          </p:cNvPicPr>
+          <p:nvPr/>
+        </p:nvPicPr>
+        <p:blipFill>
+          <a:blip r:embed="rId5" cstate="print">
+            <a:duotone>
+              <a:schemeClr val="accent2">
+                <a:shade val="45000"/>
+                <a:satMod val="135000"/>
+              </a:schemeClr>
+              <a:prstClr val="white"/>
+            </a:duotone>
+            <a:lum contrast="-40000"/>
+          </a:blip>
+          <a:stretch>
+            <a:fillRect/>
+          </a:stretch>
+        </p:blipFill>
+        <p:spPr>
+          <a:xfrm>
+            <a:off x="323529" y="305063"/>
+            <a:ext cx="2520281" cy="1157237"/>
+          </a:xfrm>
+          <a:prstGeom prst="rect">
+            <a:avLst/>
+          </a:prstGeom>
+        </p:spPr>
+      </p:pic>
+      <p:sp>
+        <p:nvSpPr>
+          <p:cNvPr id="5" name="Rectangle 1"/>
+          <p:cNvSpPr txBox="1">
+            <a:spLocks/>
+          </p:cNvSpPr>
+          <p:nvPr/>
+        </p:nvSpPr>
+        <p:spPr>
+          <a:xfrm>
+            <a:off x="2339752" y="6031543"/>
+            <a:ext cx="4806752" cy="692696"/>
+          </a:xfrm>
+          <a:prstGeom prst="rect">
+            <a:avLst/>
+          </a:prstGeom>
+        </p:spPr>
+        <p:txBody>
+          <a:bodyPr vert="horz" anchor="ctr">
+            <a:noAutofit/>
+          </a:bodyPr>
+          <a:lstStyle>
+            <a:lvl1pPr algn="l" rtl="0" eaLnBrk="1" latinLnBrk="0" hangingPunct="1">
+              <a:spcBef>
+                <a:spcPct val="0"/>
+              </a:spcBef>
+              <a:buNone/>
+              <a:defRPr sz="4400" kern="1200" cap="all" baseline="0">
+                <a:solidFill>
+                  <a:schemeClr val="tx2"/>
+                </a:solidFill>
+                <a:latin typeface="+mj-lt"/>
+                <a:ea typeface="+mj-ea"/>
+                <a:cs typeface="+mj-cs"/>
+              </a:defRPr>
+            </a:lvl1pPr>
+          </a:lstStyle>
+          <a:p>
+            <a:pPr algn="ctr"/>
+            <a:r>
+              <a:rPr lang="en-US" sz="2800" cap="none" dirty="0" smtClean="0">
+                <a:ln w="18415" cmpd="sng">
+                  <a:solidFill>
+                    <a:srgbClr val="FFFFFF"/>
+                  </a:solidFill>
+                  <a:prstDash val="solid"/>
+                </a:ln>
+                <a:solidFill>
+                  <a:srgbClr val="FFFFFF"/>
+                </a:solidFill>
+                <a:effectLst>
+                  <a:outerShdw blurRad="63500" dir="3600000" algn="tl" rotWithShape="0">
+                    <a:srgbClr val="000000">
+                      <a:alpha val="70000"/>
+                    </a:srgbClr>
+                  </a:outerShdw>
+                </a:effectLst>
+                <a:latin typeface="Times New Roman" pitchFamily="18" charset="0"/>
+                <a:cs typeface="Times New Roman" pitchFamily="18" charset="0"/>
+              </a:rPr>
+              <a:t>KHOÁ LUẬN TỐT NGHIỆP</a:t>
+            </a:r>
+            <a:endParaRPr lang="en-US" sz="3600" cap="none" dirty="0">
+              <a:ln w="18415" cmpd="sng">
+                <a:solidFill>
+                  <a:srgbClr val="FFFFFF"/>
+                </a:solidFill>
+                <a:prstDash val="solid"/>
+              </a:ln>
+              <a:solidFill>
+                <a:srgbClr val="FFFFFF"/>
+              </a:solidFill>
+              <a:effectLst>
+                <a:outerShdw blurRad="63500" dir="3600000" algn="tl" rotWithShape="0">
+                  <a:srgbClr val="000000">
+                    <a:alpha val="70000"/>
+                  </a:srgbClr>
+                </a:outerShdw>
+              </a:effectLst>
+              <a:latin typeface="Times New Roman" pitchFamily="18" charset="0"/>
+              <a:cs typeface="Times New Roman" pitchFamily="18" charset="0"/>
+            </a:endParaRPr>
+          </a:p>
+        </p:txBody>
+      </p:sp>
+      <p:sp>
+        <p:nvSpPr>
+          <p:cNvPr id="7" name="Rectangle 1"/>
+          <p:cNvSpPr txBox="1">
+            <a:spLocks/>
+          </p:cNvSpPr>
+          <p:nvPr/>
+        </p:nvSpPr>
+        <p:spPr>
+          <a:xfrm>
+            <a:off x="0" y="4005064"/>
+            <a:ext cx="9144000" cy="1879848"/>
+          </a:xfrm>
+          <a:prstGeom prst="rect">
+            <a:avLst/>
+          </a:prstGeom>
+        </p:spPr>
+        <p:txBody>
+          <a:bodyPr vert="horz" anchor="ctr">
+            <a:noAutofit/>
+            <a:scene3d>
+              <a:camera prst="orthographicFront">
+                <a:rot lat="0" lon="0" rev="0"/>
+              </a:camera>
+              <a:lightRig rig="contrasting" dir="t">
+                <a:rot lat="0" lon="0" rev="4500000"/>
+              </a:lightRig>
+            </a:scene3d>
+            <a:sp3d contourW="6350" prstMaterial="metal">
+              <a:bevelT w="127000" h="31750" prst="relaxedInset"/>
+              <a:contourClr>
+                <a:schemeClr val="accent1">
+                  <a:shade val="75000"/>
+                </a:schemeClr>
+              </a:contourClr>
+            </a:sp3d>
+          </a:bodyPr>
+          <a:lstStyle>
+            <a:lvl1pPr algn="l" rtl="0" eaLnBrk="1" latinLnBrk="0" hangingPunct="1">
+              <a:spcBef>
+                <a:spcPct val="0"/>
+              </a:spcBef>
+              <a:buNone/>
+              <a:defRPr sz="4400" b="1" kern="1200" cap="all" spc="0" baseline="0">
+                <a:ln w="0"/>
+                <a:gradFill flip="none">
+                  <a:gsLst>
+                    <a:gs pos="0">
+                      <a:schemeClr val="accent1">
+                        <a:tint val="75000"/>
+                        <a:shade val="75000"/>
+                        <a:satMod val="170000"/>
+                      </a:schemeClr>
+                    </a:gs>
+                    <a:gs pos="49000">
+                      <a:schemeClr val="accent1">
+                        <a:tint val="88000"/>
+                        <a:shade val="65000"/>
+                        <a:satMod val="172000"/>
+                      </a:schemeClr>
+                    </a:gs>
+                    <a:gs pos="50000">
+                      <a:schemeClr val="accent1">
+                        <a:shade val="65000"/>
+                        <a:satMod val="130000"/>
+                      </a:schemeClr>
+                    </a:gs>
+                    <a:gs pos="92000">
+                      <a:schemeClr val="accent1">
+                        <a:shade val="50000"/>
+                        <a:satMod val="120000"/>
+                      </a:schemeClr>
+                    </a:gs>
+                    <a:gs pos="100000">
+                      <a:schemeClr val="accent1">
+                        <a:shade val="48000"/>
+                        <a:satMod val="120000"/>
+                      </a:schemeClr>
+                    </a:gs>
+                  </a:gsLst>
+                  <a:lin ang="5400000"/>
+                </a:gradFill>
+                <a:effectLst>
+                  <a:reflection blurRad="12700" stA="50000" endPos="50000" dist="5000" dir="5400000" sy="-100000" rotWithShape="0"/>
+                </a:effectLst>
+                <a:latin typeface="Times New Roman" pitchFamily="18" charset="0"/>
+                <a:ea typeface="+mj-ea"/>
+                <a:cs typeface="Times New Roman" pitchFamily="18" charset="0"/>
+              </a:defRPr>
+            </a:lvl1pPr>
+          </a:lstStyle>
+          <a:p>
+            <a:pPr>
+              <a:lnSpc>
+                <a:spcPct val="150000"/>
+              </a:lnSpc>
+            </a:pPr>
+            <a:r>
+              <a:rPr lang="en-US" sz="2200" dirty="0" smtClean="0">
+                <a:effectLst/>
+              </a:rPr>
+              <a:t>	GIẢNG VIÊN HƯỚNG DẪN:	 TS. </a:t>
+            </a:r>
+            <a:r>
+              <a:rPr lang="en-US" sz="2200" dirty="0" err="1" smtClean="0">
+                <a:effectLst/>
+              </a:rPr>
+              <a:t>Trần</a:t>
+            </a:r>
+            <a:r>
+              <a:rPr lang="en-US" sz="2200" dirty="0" smtClean="0">
+                <a:effectLst/>
+              </a:rPr>
+              <a:t> </a:t>
+            </a:r>
+            <a:r>
+              <a:rPr lang="en-US" sz="2200" dirty="0" err="1" smtClean="0">
+                <a:effectLst/>
+              </a:rPr>
+              <a:t>vũ</a:t>
+            </a:r>
+            <a:r>
+              <a:rPr lang="en-US" sz="2200" dirty="0" smtClean="0">
+                <a:effectLst/>
+              </a:rPr>
+              <a:t> </a:t>
+            </a:r>
+            <a:r>
+              <a:rPr lang="en-US" sz="2200" dirty="0" err="1" smtClean="0">
+                <a:effectLst/>
+              </a:rPr>
+              <a:t>bình</a:t>
+            </a:r>
+            <a:endParaRPr lang="en-US" sz="2200" dirty="0" smtClean="0">
+              <a:effectLst/>
+            </a:endParaRPr>
+          </a:p>
+          <a:p>
+            <a:pPr>
+              <a:lnSpc>
+                <a:spcPct val="150000"/>
+              </a:lnSpc>
+            </a:pPr>
+            <a:r>
+              <a:rPr lang="en-US" sz="2200" dirty="0" smtClean="0">
+                <a:effectLst/>
+              </a:rPr>
+              <a:t>	</a:t>
+            </a:r>
+            <a:r>
+              <a:rPr lang="en-US" sz="2200" dirty="0" err="1" smtClean="0">
+                <a:effectLst/>
+              </a:rPr>
+              <a:t>Sinh</a:t>
+            </a:r>
+            <a:r>
+              <a:rPr lang="en-US" sz="2200" dirty="0" smtClean="0">
+                <a:effectLst/>
+              </a:rPr>
+              <a:t> </a:t>
+            </a:r>
+            <a:r>
+              <a:rPr lang="en-US" sz="2200" dirty="0" err="1" smtClean="0">
+                <a:effectLst/>
+              </a:rPr>
+              <a:t>viên</a:t>
+            </a:r>
+            <a:r>
+              <a:rPr lang="en-US" sz="2200" dirty="0" smtClean="0">
+                <a:effectLst/>
+              </a:rPr>
+              <a:t> </a:t>
+            </a:r>
+            <a:r>
+              <a:rPr lang="en-US" sz="2200" dirty="0" err="1" smtClean="0">
+                <a:effectLst/>
+              </a:rPr>
+              <a:t>thực</a:t>
+            </a:r>
+            <a:r>
+              <a:rPr lang="en-US" sz="2200" dirty="0" smtClean="0">
+                <a:effectLst/>
+              </a:rPr>
+              <a:t> </a:t>
+            </a:r>
+            <a:r>
+              <a:rPr lang="en-US" sz="2200" dirty="0" err="1" smtClean="0">
+                <a:effectLst/>
+              </a:rPr>
+              <a:t>hiện</a:t>
+            </a:r>
+            <a:r>
+              <a:rPr lang="en-US" sz="2200" dirty="0" smtClean="0">
+                <a:effectLst/>
+              </a:rPr>
+              <a:t>:	</a:t>
+            </a:r>
+            <a:r>
+              <a:rPr lang="en-US" sz="2200" dirty="0" err="1" smtClean="0">
+                <a:effectLst/>
+              </a:rPr>
+              <a:t>lê</a:t>
+            </a:r>
+            <a:r>
+              <a:rPr lang="en-US" sz="2200" dirty="0" smtClean="0">
+                <a:effectLst/>
+              </a:rPr>
+              <a:t> </a:t>
+            </a:r>
+            <a:r>
+              <a:rPr lang="en-US" sz="2200" dirty="0" err="1" smtClean="0">
+                <a:effectLst/>
+              </a:rPr>
+              <a:t>trung</a:t>
+            </a:r>
+            <a:r>
+              <a:rPr lang="en-US" sz="2200" dirty="0" smtClean="0">
+                <a:effectLst/>
+              </a:rPr>
+              <a:t> </a:t>
+            </a:r>
+            <a:r>
+              <a:rPr lang="en-US" sz="2200" dirty="0" err="1" smtClean="0">
+                <a:effectLst/>
+              </a:rPr>
+              <a:t>hiếu</a:t>
+            </a:r>
+            <a:endParaRPr lang="en-US" sz="2200" dirty="0" smtClean="0">
+              <a:effectLst/>
+            </a:endParaRPr>
+          </a:p>
+          <a:p>
+            <a:pPr>
+              <a:lnSpc>
+                <a:spcPct val="150000"/>
+              </a:lnSpc>
+            </a:pPr>
+            <a:r>
+              <a:rPr lang="en-US" sz="2200" dirty="0" smtClean="0">
+                <a:effectLst/>
+              </a:rPr>
+              <a:t>					</a:t>
+            </a:r>
+            <a:r>
+              <a:rPr lang="en-US" sz="2200" dirty="0" err="1" smtClean="0">
+                <a:effectLst/>
+              </a:rPr>
+              <a:t>Phùng</a:t>
+            </a:r>
+            <a:r>
+              <a:rPr lang="en-US" sz="2200" dirty="0" smtClean="0">
+                <a:effectLst/>
+              </a:rPr>
+              <a:t> </a:t>
+            </a:r>
+            <a:r>
+              <a:rPr lang="en-US" sz="2200" dirty="0" err="1" smtClean="0">
+                <a:effectLst/>
+              </a:rPr>
+              <a:t>chí</a:t>
+            </a:r>
+            <a:r>
+              <a:rPr lang="en-US" sz="2200" dirty="0" smtClean="0">
+                <a:effectLst/>
+              </a:rPr>
+              <a:t> </a:t>
+            </a:r>
+            <a:r>
+              <a:rPr lang="en-US" sz="2200" dirty="0" err="1" smtClean="0">
+                <a:effectLst/>
+              </a:rPr>
+              <a:t>nguyên</a:t>
+            </a:r>
+            <a:endParaRPr lang="en-US" sz="2200" dirty="0" smtClean="0">
+              <a:effectLst/>
+            </a:endParaRPr>
+          </a:p>
+          <a:p>
+            <a:pPr>
+              <a:lnSpc>
+                <a:spcPct val="150000"/>
+              </a:lnSpc>
+            </a:pPr>
+            <a:r>
+              <a:rPr lang="en-US" sz="2200" dirty="0" smtClean="0">
+                <a:effectLst/>
+              </a:rPr>
+              <a:t>					</a:t>
+            </a:r>
+            <a:r>
+              <a:rPr lang="en-US" sz="2200" dirty="0" err="1" smtClean="0">
+                <a:effectLst/>
+              </a:rPr>
+              <a:t>Lê</a:t>
+            </a:r>
+            <a:r>
+              <a:rPr lang="en-US" sz="2200" dirty="0" smtClean="0">
+                <a:effectLst/>
+              </a:rPr>
+              <a:t> </a:t>
+            </a:r>
+            <a:r>
+              <a:rPr lang="en-US" sz="2200" dirty="0" err="1" smtClean="0">
+                <a:effectLst/>
+              </a:rPr>
+              <a:t>dương</a:t>
+            </a:r>
+            <a:r>
+              <a:rPr lang="en-US" sz="2200" dirty="0" smtClean="0">
+                <a:effectLst/>
+              </a:rPr>
+              <a:t> </a:t>
+            </a:r>
+            <a:r>
+              <a:rPr lang="en-US" sz="2200" dirty="0" err="1" smtClean="0">
+                <a:effectLst/>
+              </a:rPr>
+              <a:t>công</a:t>
+            </a:r>
+            <a:r>
+              <a:rPr lang="en-US" sz="2200" dirty="0" smtClean="0">
+                <a:effectLst/>
+              </a:rPr>
+              <a:t> </a:t>
+            </a:r>
+            <a:r>
+              <a:rPr lang="en-US" sz="2200" dirty="0" err="1" smtClean="0">
+                <a:effectLst/>
+              </a:rPr>
+              <a:t>phúc</a:t>
+            </a:r>
+            <a:endParaRPr lang="en-US" sz="2200" dirty="0" smtClean="0">
+              <a:effectLst/>
+            </a:endParaRPr>
+          </a:p>
+        </p:txBody>
+      </p:sp>
+    </p:spTree>
+  </p:cSld>
+  <p:clrMapOvr>
+    <a:masterClrMapping/>
+  </p:clrMapOvr>
+  <mc:AlternateContent xmlns:mc="http://schemas.openxmlformats.org/markup-compatibility/2006" xmlns:p14="http://schemas.microsoft.com/office/powerpoint/2010/main">
+    <mc:Choice Requires="p14">
+      <p:transition p14:dur="0"/>
+    </mc:Choice>
+    <mc:Fallback xmlns="">
+      <p:transition/>
+    </mc:Fallback>
+  </mc:AlternateContent>
+  <p:timing>
+    <p:tnLst>
+      <p:par>
+        <p:cTn id="1" dur="indefinite" restart="never" nodeType="tmRoot"/>
+      </p:par>
+    </p:tnLst>
+  </p:timing>
+</p:sld>
+</file>
+
+<file path=ppt/slides/slide20.xml><?xml version="1.0" encoding="utf-8"?>
 <p:sld xmlns:a="http://schemas.openxmlformats.org/drawingml/2006/main" xmlns:r="http://schemas.openxmlformats.org/officeDocument/2006/relationships" xmlns:p="http://schemas.openxmlformats.org/presentationml/2006/main">
   <p:cSld>
     <p:spTree>
@@ -13584,7 +13680,7 @@
             <a:fld id="{1AD93096-5B34-4342-9326-69289CEAE4C2}" type="slidenum">
               <a:rPr lang="en-US" smtClean="0"/>
               <a:pPr/>
-              <a:t>21</a:t>
+              <a:t>20</a:t>
             </a:fld>
             <a:endParaRPr lang="en-US" dirty="0">
               <a:solidFill>
@@ -13701,7 +13797,7 @@
 </p:sld>
 </file>
 
-<file path=ppt/slides/slide22.xml><?xml version="1.0" encoding="utf-8"?>
+<file path=ppt/slides/slide21.xml><?xml version="1.0" encoding="utf-8"?>
 <p:sld xmlns:a="http://schemas.openxmlformats.org/drawingml/2006/main" xmlns:r="http://schemas.openxmlformats.org/officeDocument/2006/relationships" xmlns:p="http://schemas.openxmlformats.org/presentationml/2006/main">
   <p:cSld>
     <p:spTree>
@@ -13949,7 +14045,7 @@
             <a:fld id="{1AD93096-5B34-4342-9326-69289CEAE4C2}" type="slidenum">
               <a:rPr lang="en-US" smtClean="0"/>
               <a:pPr/>
-              <a:t>22</a:t>
+              <a:t>21</a:t>
             </a:fld>
             <a:endParaRPr lang="en-US" dirty="0">
               <a:solidFill>
@@ -14076,7 +14172,7 @@
 </p:sld>
 </file>
 
-<file path=ppt/slides/slide23.xml><?xml version="1.0" encoding="utf-8"?>
+<file path=ppt/slides/slide22.xml><?xml version="1.0" encoding="utf-8"?>
 <p:sld xmlns:a="http://schemas.openxmlformats.org/drawingml/2006/main" xmlns:r="http://schemas.openxmlformats.org/officeDocument/2006/relationships" xmlns:p="http://schemas.openxmlformats.org/presentationml/2006/main">
   <p:cSld>
     <p:spTree>
@@ -14162,7 +14258,7 @@
             <a:fld id="{1AD93096-5B34-4342-9326-69289CEAE4C2}" type="slidenum">
               <a:rPr lang="en-US" smtClean="0"/>
               <a:pPr/>
-              <a:t>23</a:t>
+              <a:t>22</a:t>
             </a:fld>
             <a:endParaRPr lang="en-US" dirty="0">
               <a:solidFill>
@@ -14258,7 +14354,7 @@
 </p:sld>
 </file>
 
-<file path=ppt/slides/slide24.xml><?xml version="1.0" encoding="utf-8"?>
+<file path=ppt/slides/slide23.xml><?xml version="1.0" encoding="utf-8"?>
 <p:sld xmlns:a="http://schemas.openxmlformats.org/drawingml/2006/main" xmlns:r="http://schemas.openxmlformats.org/officeDocument/2006/relationships" xmlns:p="http://schemas.openxmlformats.org/presentationml/2006/main">
   <p:cSld>
     <p:spTree>
@@ -14321,7 +14417,7 @@
             <a:fld id="{1AD93096-5B34-4342-9326-69289CEAE4C2}" type="slidenum">
               <a:rPr lang="en-US" smtClean="0"/>
               <a:pPr algn="ctr"/>
-              <a:t>24</a:t>
+              <a:t>23</a:t>
             </a:fld>
             <a:endParaRPr lang="en-US" sz="2400" dirty="0">
               <a:solidFill>
@@ -14411,7 +14507,7 @@
 </p:sld>
 </file>
 
-<file path=ppt/slides/slide25.xml><?xml version="1.0" encoding="utf-8"?>
+<file path=ppt/slides/slide24.xml><?xml version="1.0" encoding="utf-8"?>
 <p:sld xmlns:a="http://schemas.openxmlformats.org/drawingml/2006/main" xmlns:r="http://schemas.openxmlformats.org/officeDocument/2006/relationships" xmlns:p="http://schemas.openxmlformats.org/presentationml/2006/main">
   <p:cSld>
     <p:spTree>
@@ -14517,7 +14613,7 @@
             <a:fld id="{1AD93096-5B34-4342-9326-69289CEAE4C2}" type="slidenum">
               <a:rPr lang="en-US" smtClean="0"/>
               <a:pPr/>
-              <a:t>25</a:t>
+              <a:t>24</a:t>
             </a:fld>
             <a:endParaRPr lang="en-US" dirty="0">
               <a:solidFill>
@@ -14643,7 +14739,7 @@
 </p:sld>
 </file>
 
-<file path=ppt/slides/slide26.xml><?xml version="1.0" encoding="utf-8"?>
+<file path=ppt/slides/slide25.xml><?xml version="1.0" encoding="utf-8"?>
 <p:sld xmlns:a="http://schemas.openxmlformats.org/drawingml/2006/main" xmlns:r="http://schemas.openxmlformats.org/officeDocument/2006/relationships" xmlns:p="http://schemas.openxmlformats.org/presentationml/2006/main">
   <p:cSld>
     <p:spTree>
@@ -14725,7 +14821,7 @@
             <a:fld id="{1AD93096-5B34-4342-9326-69289CEAE4C2}" type="slidenum">
               <a:rPr lang="en-US" smtClean="0"/>
               <a:pPr/>
-              <a:t>26</a:t>
+              <a:t>25</a:t>
             </a:fld>
             <a:endParaRPr lang="en-US" dirty="0">
               <a:solidFill>
@@ -14820,7 +14916,7 @@
           <a:graphicData uri="http://schemas.openxmlformats.org/presentationml/2006/ole">
             <mc:AlternateContent xmlns:mc="http://schemas.openxmlformats.org/markup-compatibility/2006">
               <mc:Choice xmlns:v="urn:schemas-microsoft-com:vml" Requires="v">
-                <p:oleObj spid="_x0000_s2071" name="Visio" r:id="rId3" imgW="5596684" imgH="6352347" progId="Visio.Drawing.11">
+                <p:oleObj spid="_x0000_s2089" name="Visio" r:id="rId3" imgW="5596684" imgH="6352347" progId="Visio.Drawing.11">
                   <p:embed/>
                 </p:oleObj>
               </mc:Choice>
@@ -14894,7 +14990,7 @@
 </p:sld>
 </file>
 
-<file path=ppt/slides/slide27.xml><?xml version="1.0" encoding="utf-8"?>
+<file path=ppt/slides/slide26.xml><?xml version="1.0" encoding="utf-8"?>
 <p:sld xmlns:a="http://schemas.openxmlformats.org/drawingml/2006/main" xmlns:r="http://schemas.openxmlformats.org/officeDocument/2006/relationships" xmlns:p="http://schemas.openxmlformats.org/presentationml/2006/main">
   <p:cSld>
     <p:spTree>
@@ -14956,7 +15052,7 @@
             <a:fld id="{1AD93096-5B34-4342-9326-69289CEAE4C2}" type="slidenum">
               <a:rPr lang="en-US" smtClean="0"/>
               <a:pPr/>
-              <a:t>27</a:t>
+              <a:t>26</a:t>
             </a:fld>
             <a:endParaRPr lang="en-US" dirty="0">
               <a:solidFill>
@@ -15052,7 +15148,7 @@
 </p:sld>
 </file>
 
-<file path=ppt/slides/slide28.xml><?xml version="1.0" encoding="utf-8"?>
+<file path=ppt/slides/slide27.xml><?xml version="1.0" encoding="utf-8"?>
 <p:sld xmlns:a="http://schemas.openxmlformats.org/drawingml/2006/main" xmlns:r="http://schemas.openxmlformats.org/officeDocument/2006/relationships" xmlns:p="http://schemas.openxmlformats.org/presentationml/2006/main">
   <p:cSld>
     <p:spTree>
@@ -15141,7 +15237,7 @@
             <a:fld id="{1AD93096-5B34-4342-9326-69289CEAE4C2}" type="slidenum">
               <a:rPr lang="en-US" smtClean="0"/>
               <a:pPr/>
-              <a:t>28</a:t>
+              <a:t>27</a:t>
             </a:fld>
             <a:endParaRPr lang="en-US" dirty="0">
               <a:solidFill>
@@ -15212,6 +15308,117 @@
 </p:sld>
 </file>
 
+<file path=ppt/slides/slide28.xml><?xml version="1.0" encoding="utf-8"?>
+<p:sld xmlns:a="http://schemas.openxmlformats.org/drawingml/2006/main" xmlns:r="http://schemas.openxmlformats.org/officeDocument/2006/relationships" xmlns:p="http://schemas.openxmlformats.org/presentationml/2006/main">
+  <p:cSld>
+    <p:spTree>
+      <p:nvGrpSpPr>
+        <p:cNvPr id="1" name=""/>
+        <p:cNvGrpSpPr/>
+        <p:nvPr/>
+      </p:nvGrpSpPr>
+      <p:grpSpPr>
+        <a:xfrm>
+          <a:off x="0" y="0"/>
+          <a:ext cx="0" cy="0"/>
+          <a:chOff x="0" y="0"/>
+          <a:chExt cx="0" cy="0"/>
+        </a:xfrm>
+      </p:grpSpPr>
+      <p:sp>
+        <p:nvSpPr>
+          <p:cNvPr id="2" name="Title 1"/>
+          <p:cNvSpPr>
+            <a:spLocks noGrp="1"/>
+          </p:cNvSpPr>
+          <p:nvPr>
+            <p:ph type="title"/>
+          </p:nvPr>
+        </p:nvSpPr>
+        <p:spPr/>
+        <p:txBody>
+          <a:bodyPr>
+            <a:normAutofit/>
+          </a:bodyPr>
+          <a:lstStyle/>
+          <a:p>
+            <a:r>
+              <a:rPr lang="en-US" dirty="0" smtClean="0"/>
+              <a:t>KẾT QUẢ ĐẠT ĐƯỢC</a:t>
+            </a:r>
+            <a:endParaRPr lang="vi-VN" dirty="0"/>
+          </a:p>
+        </p:txBody>
+      </p:sp>
+      <p:sp>
+        <p:nvSpPr>
+          <p:cNvPr id="3" name="Slide Number Placeholder 2"/>
+          <p:cNvSpPr>
+            <a:spLocks noGrp="1"/>
+          </p:cNvSpPr>
+          <p:nvPr>
+            <p:ph type="sldNum" sz="quarter" idx="12"/>
+          </p:nvPr>
+        </p:nvSpPr>
+        <p:spPr/>
+        <p:txBody>
+          <a:bodyPr>
+            <a:normAutofit fontScale="85000" lnSpcReduction="20000"/>
+          </a:bodyPr>
+          <a:lstStyle/>
+          <a:p>
+            <a:fld id="{1AD93096-5B34-4342-9326-69289CEAE4C2}" type="slidenum">
+              <a:rPr lang="en-US" smtClean="0"/>
+              <a:pPr/>
+              <a:t>28</a:t>
+            </a:fld>
+            <a:endParaRPr lang="en-US" dirty="0">
+              <a:solidFill>
+                <a:srgbClr val="FFFFFF"/>
+              </a:solidFill>
+            </a:endParaRPr>
+          </a:p>
+        </p:txBody>
+      </p:sp>
+      <p:sp>
+        <p:nvSpPr>
+          <p:cNvPr id="4" name="Content Placeholder 3"/>
+          <p:cNvSpPr>
+            <a:spLocks noGrp="1"/>
+          </p:cNvSpPr>
+          <p:nvPr>
+            <p:ph sz="quarter" idx="1"/>
+          </p:nvPr>
+        </p:nvSpPr>
+        <p:spPr/>
+        <p:txBody>
+          <a:bodyPr/>
+          <a:lstStyle/>
+          <a:p>
+            <a:endParaRPr lang="vi-VN"/>
+          </a:p>
+        </p:txBody>
+      </p:sp>
+    </p:spTree>
+    <p:extLst>
+      <p:ext uri="{BB962C8B-B14F-4D97-AF65-F5344CB8AC3E}">
+        <p14:creationId xmlns:p14="http://schemas.microsoft.com/office/powerpoint/2010/main" val="3067536780"/>
+      </p:ext>
+    </p:extLst>
+  </p:cSld>
+  <p:clrMapOvr>
+    <a:masterClrMapping/>
+  </p:clrMapOvr>
+  <p:timing>
+    <p:tnLst>
+      <p:par>
+        <p:cTn id="1" dur="indefinite" restart="never" nodeType="tmRoot"/>
+      </p:par>
+    </p:tnLst>
+  </p:timing>
+</p:sld>
+</file>
+
 <file path=ppt/slides/slide29.xml><?xml version="1.0" encoding="utf-8"?>
 <p:sld xmlns:a="http://schemas.openxmlformats.org/drawingml/2006/main" xmlns:r="http://schemas.openxmlformats.org/officeDocument/2006/relationships" xmlns:p="http://schemas.openxmlformats.org/presentationml/2006/main">
   <p:cSld>
@@ -15247,8 +15454,8 @@
           <a:lstStyle/>
           <a:p>
             <a:r>
-              <a:rPr lang="en-US" dirty="0" smtClean="0"/>
-              <a:t>KẾT QUẢ ĐẠT ĐƯỢC</a:t>
+              <a:rPr lang="en-US" smtClean="0"/>
+              <a:t>Đánh giá</a:t>
             </a:r>
             <a:endParaRPr lang="vi-VN" dirty="0"/>
           </a:p>
@@ -15276,17 +15483,13 @@
               <a:pPr/>
               <a:t>29</a:t>
             </a:fld>
-            <a:endParaRPr lang="en-US" dirty="0">
-              <a:solidFill>
-                <a:srgbClr val="FFFFFF"/>
-              </a:solidFill>
-            </a:endParaRPr>
+            <a:endParaRPr lang="en-US" dirty="0"/>
           </a:p>
         </p:txBody>
       </p:sp>
       <p:sp>
         <p:nvSpPr>
-          <p:cNvPr id="4" name="Content Placeholder 3"/>
+          <p:cNvPr id="6" name="Content Placeholder 5"/>
           <p:cNvSpPr>
             <a:spLocks noGrp="1"/>
           </p:cNvSpPr>
@@ -15306,7 +15509,7 @@
     </p:spTree>
     <p:extLst>
       <p:ext uri="{BB962C8B-B14F-4D97-AF65-F5344CB8AC3E}">
-        <p14:creationId xmlns:p14="http://schemas.microsoft.com/office/powerpoint/2010/main" val="3067536780"/>
+        <p14:creationId xmlns:p14="http://schemas.microsoft.com/office/powerpoint/2010/main" val="2449681135"/>
       </p:ext>
     </p:extLst>
   </p:cSld>
@@ -15653,8 +15856,24 @@
           <a:lstStyle/>
           <a:p>
             <a:r>
-              <a:rPr lang="en-US" smtClean="0"/>
-              <a:t>Đánh giá</a:t>
+              <a:rPr lang="en-US" dirty="0" err="1" smtClean="0"/>
+              <a:t>Những</a:t>
+            </a:r>
+            <a:r>
+              <a:rPr lang="en-US" dirty="0" smtClean="0"/>
+              <a:t> </a:t>
+            </a:r>
+            <a:r>
+              <a:rPr lang="en-US" dirty="0" err="1" smtClean="0"/>
+              <a:t>hạn</a:t>
+            </a:r>
+            <a:r>
+              <a:rPr lang="en-US" dirty="0" smtClean="0"/>
+              <a:t> </a:t>
+            </a:r>
+            <a:r>
+              <a:rPr lang="en-US" dirty="0" err="1" smtClean="0"/>
+              <a:t>chế</a:t>
             </a:r>
             <a:endParaRPr lang="vi-VN" dirty="0"/>
           </a:p>
@@ -15682,13 +15901,17 @@
               <a:pPr/>
               <a:t>30</a:t>
             </a:fld>
-            <a:endParaRPr lang="en-US" dirty="0"/>
+            <a:endParaRPr lang="en-US" dirty="0">
+              <a:solidFill>
+                <a:srgbClr val="FFFFFF"/>
+              </a:solidFill>
+            </a:endParaRPr>
           </a:p>
         </p:txBody>
       </p:sp>
       <p:sp>
         <p:nvSpPr>
-          <p:cNvPr id="6" name="Content Placeholder 5"/>
+          <p:cNvPr id="4" name="Content Placeholder 3"/>
           <p:cNvSpPr>
             <a:spLocks noGrp="1"/>
           </p:cNvSpPr>
@@ -15708,7 +15931,7 @@
     </p:spTree>
     <p:extLst>
       <p:ext uri="{BB962C8B-B14F-4D97-AF65-F5344CB8AC3E}">
-        <p14:creationId xmlns:p14="http://schemas.microsoft.com/office/powerpoint/2010/main" val="2449681135"/>
+        <p14:creationId xmlns:p14="http://schemas.microsoft.com/office/powerpoint/2010/main" val="1913792255"/>
       </p:ext>
     </p:extLst>
   </p:cSld>
@@ -15744,7 +15967,26 @@
       </p:grpSpPr>
       <p:sp>
         <p:nvSpPr>
-          <p:cNvPr id="2" name="Title 1"/>
+          <p:cNvPr id="5" name="Text Placeholder 4"/>
+          <p:cNvSpPr>
+            <a:spLocks noGrp="1"/>
+          </p:cNvSpPr>
+          <p:nvPr>
+            <p:ph type="body" idx="1"/>
+          </p:nvPr>
+        </p:nvSpPr>
+        <p:spPr/>
+        <p:txBody>
+          <a:bodyPr/>
+          <a:lstStyle/>
+          <a:p>
+            <a:endParaRPr lang="vi-VN"/>
+          </a:p>
+        </p:txBody>
+      </p:sp>
+      <p:sp>
+        <p:nvSpPr>
+          <p:cNvPr id="4" name="Title 3"/>
           <p:cNvSpPr>
             <a:spLocks noGrp="1"/>
           </p:cNvSpPr>
@@ -15760,24 +16002,8 @@
           <a:lstStyle/>
           <a:p>
             <a:r>
-              <a:rPr lang="en-US" dirty="0" err="1" smtClean="0"/>
-              <a:t>Những</a:t>
-            </a:r>
-            <a:r>
               <a:rPr lang="en-US" dirty="0" smtClean="0"/>
-              <a:t> </a:t>
-            </a:r>
-            <a:r>
-              <a:rPr lang="en-US" dirty="0" err="1" smtClean="0"/>
-              <a:t>hạn</a:t>
-            </a:r>
-            <a:r>
-              <a:rPr lang="en-US" dirty="0" smtClean="0"/>
-              <a:t> </a:t>
-            </a:r>
-            <a:r>
-              <a:rPr lang="en-US" dirty="0" err="1" smtClean="0"/>
-              <a:t>chế</a:t>
+              <a:t>DEMONSTRATION</a:t>
             </a:r>
             <a:endParaRPr lang="vi-VN" dirty="0"/>
           </a:p>
@@ -15790,13 +16016,13 @@
             <a:spLocks noGrp="1"/>
           </p:cNvSpPr>
           <p:nvPr>
-            <p:ph type="sldNum" sz="quarter" idx="12"/>
+            <p:ph type="sldNum" sz="quarter" idx="11"/>
           </p:nvPr>
         </p:nvSpPr>
         <p:spPr/>
         <p:txBody>
           <a:bodyPr>
-            <a:normAutofit fontScale="85000" lnSpcReduction="20000"/>
+            <a:normAutofit/>
           </a:bodyPr>
           <a:lstStyle/>
           <a:p>
@@ -15813,29 +16039,10 @@
           </a:p>
         </p:txBody>
       </p:sp>
-      <p:sp>
-        <p:nvSpPr>
-          <p:cNvPr id="4" name="Content Placeholder 3"/>
-          <p:cNvSpPr>
-            <a:spLocks noGrp="1"/>
-          </p:cNvSpPr>
-          <p:nvPr>
-            <p:ph sz="quarter" idx="1"/>
-          </p:nvPr>
-        </p:nvSpPr>
-        <p:spPr/>
-        <p:txBody>
-          <a:bodyPr/>
-          <a:lstStyle/>
-          <a:p>
-            <a:endParaRPr lang="vi-VN"/>
-          </a:p>
-        </p:txBody>
-      </p:sp>
     </p:spTree>
     <p:extLst>
       <p:ext uri="{BB962C8B-B14F-4D97-AF65-F5344CB8AC3E}">
-        <p14:creationId xmlns:p14="http://schemas.microsoft.com/office/powerpoint/2010/main" val="1913792255"/>
+        <p14:creationId xmlns:p14="http://schemas.microsoft.com/office/powerpoint/2010/main" val="1870866790"/>
       </p:ext>
     </p:extLst>
   </p:cSld>
@@ -15907,7 +16114,7 @@
           <a:p>
             <a:r>
               <a:rPr lang="en-US" dirty="0" smtClean="0"/>
-              <a:t>DEMONSTRATION</a:t>
+              <a:t>Q &amp; A</a:t>
             </a:r>
             <a:endParaRPr lang="vi-VN" dirty="0"/>
           </a:p>
@@ -15946,7 +16153,7 @@
     </p:spTree>
     <p:extLst>
       <p:ext uri="{BB962C8B-B14F-4D97-AF65-F5344CB8AC3E}">
-        <p14:creationId xmlns:p14="http://schemas.microsoft.com/office/powerpoint/2010/main" val="1870866790"/>
+        <p14:creationId xmlns:p14="http://schemas.microsoft.com/office/powerpoint/2010/main" val="2443692379"/>
       </p:ext>
     </p:extLst>
   </p:cSld>
@@ -15982,117 +16189,6 @@
       </p:grpSpPr>
       <p:sp>
         <p:nvSpPr>
-          <p:cNvPr id="5" name="Text Placeholder 4"/>
-          <p:cNvSpPr>
-            <a:spLocks noGrp="1"/>
-          </p:cNvSpPr>
-          <p:nvPr>
-            <p:ph type="body" idx="1"/>
-          </p:nvPr>
-        </p:nvSpPr>
-        <p:spPr/>
-        <p:txBody>
-          <a:bodyPr/>
-          <a:lstStyle/>
-          <a:p>
-            <a:endParaRPr lang="vi-VN"/>
-          </a:p>
-        </p:txBody>
-      </p:sp>
-      <p:sp>
-        <p:nvSpPr>
-          <p:cNvPr id="4" name="Title 3"/>
-          <p:cNvSpPr>
-            <a:spLocks noGrp="1"/>
-          </p:cNvSpPr>
-          <p:nvPr>
-            <p:ph type="title"/>
-          </p:nvPr>
-        </p:nvSpPr>
-        <p:spPr/>
-        <p:txBody>
-          <a:bodyPr>
-            <a:normAutofit/>
-          </a:bodyPr>
-          <a:lstStyle/>
-          <a:p>
-            <a:r>
-              <a:rPr lang="en-US" dirty="0" smtClean="0"/>
-              <a:t>Q &amp; A</a:t>
-            </a:r>
-            <a:endParaRPr lang="vi-VN" dirty="0"/>
-          </a:p>
-        </p:txBody>
-      </p:sp>
-      <p:sp>
-        <p:nvSpPr>
-          <p:cNvPr id="3" name="Slide Number Placeholder 2"/>
-          <p:cNvSpPr>
-            <a:spLocks noGrp="1"/>
-          </p:cNvSpPr>
-          <p:nvPr>
-            <p:ph type="sldNum" sz="quarter" idx="11"/>
-          </p:nvPr>
-        </p:nvSpPr>
-        <p:spPr/>
-        <p:txBody>
-          <a:bodyPr>
-            <a:normAutofit/>
-          </a:bodyPr>
-          <a:lstStyle/>
-          <a:p>
-            <a:fld id="{1AD93096-5B34-4342-9326-69289CEAE4C2}" type="slidenum">
-              <a:rPr lang="en-US" smtClean="0"/>
-              <a:pPr/>
-              <a:t>33</a:t>
-            </a:fld>
-            <a:endParaRPr lang="en-US" dirty="0">
-              <a:solidFill>
-                <a:srgbClr val="FFFFFF"/>
-              </a:solidFill>
-            </a:endParaRPr>
-          </a:p>
-        </p:txBody>
-      </p:sp>
-    </p:spTree>
-    <p:extLst>
-      <p:ext uri="{BB962C8B-B14F-4D97-AF65-F5344CB8AC3E}">
-        <p14:creationId xmlns:p14="http://schemas.microsoft.com/office/powerpoint/2010/main" val="2443692379"/>
-      </p:ext>
-    </p:extLst>
-  </p:cSld>
-  <p:clrMapOvr>
-    <a:masterClrMapping/>
-  </p:clrMapOvr>
-  <p:timing>
-    <p:tnLst>
-      <p:par>
-        <p:cTn id="1" dur="indefinite" restart="never" nodeType="tmRoot"/>
-      </p:par>
-    </p:tnLst>
-  </p:timing>
-</p:sld>
-</file>
-
-<file path=ppt/slides/slide34.xml><?xml version="1.0" encoding="utf-8"?>
-<p:sld xmlns:a="http://schemas.openxmlformats.org/drawingml/2006/main" xmlns:r="http://schemas.openxmlformats.org/officeDocument/2006/relationships" xmlns:p="http://schemas.openxmlformats.org/presentationml/2006/main">
-  <p:cSld>
-    <p:spTree>
-      <p:nvGrpSpPr>
-        <p:cNvPr id="1" name=""/>
-        <p:cNvGrpSpPr/>
-        <p:nvPr/>
-      </p:nvGrpSpPr>
-      <p:grpSpPr>
-        <a:xfrm>
-          <a:off x="0" y="0"/>
-          <a:ext cx="0" cy="0"/>
-          <a:chOff x="0" y="0"/>
-          <a:chExt cx="0" cy="0"/>
-        </a:xfrm>
-      </p:grpSpPr>
-      <p:sp>
-        <p:nvSpPr>
           <p:cNvPr id="8" name="Text Placeholder 7"/>
           <p:cNvSpPr>
             <a:spLocks noGrp="1"/>
@@ -16160,7 +16256,7 @@
             <a:fld id="{1AD93096-5B34-4342-9326-69289CEAE4C2}" type="slidenum">
               <a:rPr lang="en-US" smtClean="0"/>
               <a:pPr/>
-              <a:t>34</a:t>
+              <a:t>33</a:t>
             </a:fld>
             <a:endParaRPr lang="en-US" dirty="0">
               <a:solidFill>
@@ -16829,11 +16925,7 @@
             </a:r>
             <a:r>
               <a:rPr lang="en-US" smtClean="0"/>
-              <a:t> c</a:t>
-            </a:r>
-            <a:r>
-              <a:rPr lang="en-US" smtClean="0"/>
-              <a:t>ó thể </a:t>
+              <a:t> có thể </a:t>
             </a:r>
             <a:r>
               <a:rPr lang="en-US" i="1" smtClean="0">
@@ -17274,11 +17366,7 @@
           <a:p>
             <a:r>
               <a:rPr lang="en-US"/>
-              <a:t>Bài toán kiến </a:t>
-            </a:r>
-            <a:r>
-              <a:rPr lang="en-US"/>
-              <a:t>trúc </a:t>
+              <a:t>Bài toán kiến trúc </a:t>
             </a:r>
             <a:r>
               <a:rPr lang="en-US" smtClean="0"/>

</xml_diff>